<commit_message>
Updated presentation exercise slides to reflect new notebook sequencing.
</commit_message>
<xml_diff>
--- a/presentations/01_cnn_intro.pptx
+++ b/presentations/01_cnn_intro.pptx
@@ -5,7 +5,7 @@
     <p:sldMasterId id="2147483648" r:id="rId1"/>
   </p:sldMasterIdLst>
   <p:notesMasterIdLst>
-    <p:notesMasterId r:id="rId17"/>
+    <p:notesMasterId r:id="rId18"/>
   </p:notesMasterIdLst>
   <p:sldIdLst>
     <p:sldId id="322" r:id="rId2"/>
@@ -22,7 +22,8 @@
     <p:sldId id="325" r:id="rId13"/>
     <p:sldId id="299" r:id="rId14"/>
     <p:sldId id="326" r:id="rId15"/>
-    <p:sldId id="327" r:id="rId16"/>
+    <p:sldId id="324" r:id="rId16"/>
+    <p:sldId id="327" r:id="rId17"/>
   </p:sldIdLst>
   <p:sldSz cx="12192000" cy="6858000"/>
   <p:notesSz cx="7077075" cy="9363075"/>
@@ -222,7 +223,7 @@
           <a:p>
             <a:fld id="{FD93C9B2-20F6-4DB1-B471-224337D0AC79}" type="datetimeFigureOut">
               <a:rPr lang="en-US" smtClean="0"/>
-              <a:t>2/23/2022</a:t>
+              <a:t>5/26/2022</a:t>
             </a:fld>
             <a:endParaRPr lang="en-US"/>
           </a:p>
@@ -1970,6 +1971,18 @@
           <a:bodyPr/>
           <a:lstStyle/>
           <a:p>
+            <a:pPr defTabSz="939363">
+              <a:defRPr/>
+            </a:pPr>
+            <a:r>
+              <a:rPr lang="en-US" dirty="0"/>
+              <a:t>The exercise for this workshop starts on page 123 of the textbook. </a:t>
+            </a:r>
+          </a:p>
+          <a:p>
+            <a:pPr defTabSz="939363">
+              <a:defRPr/>
+            </a:pPr>
             <a:endParaRPr lang="en-US" dirty="0"/>
           </a:p>
         </p:txBody>
@@ -1992,6 +2005,90 @@
             <a:fld id="{3148858F-F1DB-4027-9C85-CCA6849540DD}" type="slidenum">
               <a:rPr lang="en-US" smtClean="0"/>
               <a:t>15</a:t>
+            </a:fld>
+            <a:endParaRPr lang="en-US"/>
+          </a:p>
+        </p:txBody>
+      </p:sp>
+    </p:spTree>
+    <p:extLst>
+      <p:ext uri="{BB962C8B-B14F-4D97-AF65-F5344CB8AC3E}">
+        <p14:creationId xmlns:p14="http://schemas.microsoft.com/office/powerpoint/2010/main" val="1984289498"/>
+      </p:ext>
+    </p:extLst>
+  </p:cSld>
+  <p:clrMapOvr>
+    <a:masterClrMapping/>
+  </p:clrMapOvr>
+</p:notes>
+</file>
+
+<file path=ppt/notesSlides/notesSlide16.xml><?xml version="1.0" encoding="utf-8"?>
+<p:notes xmlns:a="http://schemas.openxmlformats.org/drawingml/2006/main" xmlns:r="http://schemas.openxmlformats.org/officeDocument/2006/relationships" xmlns:p="http://schemas.openxmlformats.org/presentationml/2006/main">
+  <p:cSld>
+    <p:spTree>
+      <p:nvGrpSpPr>
+        <p:cNvPr id="1" name=""/>
+        <p:cNvGrpSpPr/>
+        <p:nvPr/>
+      </p:nvGrpSpPr>
+      <p:grpSpPr>
+        <a:xfrm>
+          <a:off x="0" y="0"/>
+          <a:ext cx="0" cy="0"/>
+          <a:chOff x="0" y="0"/>
+          <a:chExt cx="0" cy="0"/>
+        </a:xfrm>
+      </p:grpSpPr>
+      <p:sp>
+        <p:nvSpPr>
+          <p:cNvPr id="2" name="Slide Image Placeholder 1"/>
+          <p:cNvSpPr>
+            <a:spLocks noGrp="1" noRot="1" noChangeAspect="1"/>
+          </p:cNvSpPr>
+          <p:nvPr>
+            <p:ph type="sldImg"/>
+          </p:nvPr>
+        </p:nvSpPr>
+        <p:spPr/>
+      </p:sp>
+      <p:sp>
+        <p:nvSpPr>
+          <p:cNvPr id="3" name="Notes Placeholder 2"/>
+          <p:cNvSpPr>
+            <a:spLocks noGrp="1"/>
+          </p:cNvSpPr>
+          <p:nvPr>
+            <p:ph type="body" idx="1"/>
+          </p:nvPr>
+        </p:nvSpPr>
+        <p:spPr/>
+        <p:txBody>
+          <a:bodyPr/>
+          <a:lstStyle/>
+          <a:p>
+            <a:endParaRPr lang="en-US" dirty="0"/>
+          </a:p>
+        </p:txBody>
+      </p:sp>
+      <p:sp>
+        <p:nvSpPr>
+          <p:cNvPr id="4" name="Slide Number Placeholder 3"/>
+          <p:cNvSpPr>
+            <a:spLocks noGrp="1"/>
+          </p:cNvSpPr>
+          <p:nvPr>
+            <p:ph type="sldNum" sz="quarter" idx="5"/>
+          </p:nvPr>
+        </p:nvSpPr>
+        <p:spPr/>
+        <p:txBody>
+          <a:bodyPr/>
+          <a:lstStyle/>
+          <a:p>
+            <a:fld id="{3148858F-F1DB-4027-9C85-CCA6849540DD}" type="slidenum">
+              <a:rPr lang="en-US" smtClean="0"/>
+              <a:t>16</a:t>
             </a:fld>
             <a:endParaRPr lang="en-US"/>
           </a:p>
@@ -2053,6 +2150,24 @@
         <p:txBody>
           <a:bodyPr/>
           <a:lstStyle/>
+          <a:p>
+            <a:pPr defTabSz="939363">
+              <a:defRPr/>
+            </a:pPr>
+            <a:r>
+              <a:rPr lang="en-US" dirty="0"/>
+              <a:t>Students who have not yet validated their HiperGator account should work through the steps in this document:</a:t>
+            </a:r>
+          </a:p>
+          <a:p>
+            <a:pPr defTabSz="939363">
+              <a:defRPr/>
+            </a:pPr>
+            <a:r>
+              <a:rPr lang="en-US" b="1" i="1"/>
+              <a:t>https://github.com/PracticumAI-Test/HPG_Jupyter_Setup</a:t>
+            </a:r>
+          </a:p>
           <a:p>
             <a:endParaRPr lang="en-US" dirty="0">
               <a:latin typeface="Palatino Linotype" panose="02040502050505030304" pitchFamily="18" charset="0"/>
@@ -3820,7 +3935,7 @@
           <a:p>
             <a:fld id="{C3F78080-8D0A-4BE8-A5B4-CB115102D524}" type="datetimeFigureOut">
               <a:rPr lang="en-US" smtClean="0"/>
-              <a:t>2/23/2022</a:t>
+              <a:t>5/26/2022</a:t>
             </a:fld>
             <a:endParaRPr lang="en-US"/>
           </a:p>
@@ -4018,7 +4133,7 @@
           <a:p>
             <a:fld id="{C3F78080-8D0A-4BE8-A5B4-CB115102D524}" type="datetimeFigureOut">
               <a:rPr lang="en-US" smtClean="0"/>
-              <a:t>2/23/2022</a:t>
+              <a:t>5/26/2022</a:t>
             </a:fld>
             <a:endParaRPr lang="en-US"/>
           </a:p>
@@ -4226,7 +4341,7 @@
           <a:p>
             <a:fld id="{C3F78080-8D0A-4BE8-A5B4-CB115102D524}" type="datetimeFigureOut">
               <a:rPr lang="en-US" smtClean="0"/>
-              <a:t>2/23/2022</a:t>
+              <a:t>5/26/2022</a:t>
             </a:fld>
             <a:endParaRPr lang="en-US"/>
           </a:p>
@@ -4424,7 +4539,7 @@
           <a:p>
             <a:fld id="{C3F78080-8D0A-4BE8-A5B4-CB115102D524}" type="datetimeFigureOut">
               <a:rPr lang="en-US" smtClean="0"/>
-              <a:t>2/23/2022</a:t>
+              <a:t>5/26/2022</a:t>
             </a:fld>
             <a:endParaRPr lang="en-US"/>
           </a:p>
@@ -4699,7 +4814,7 @@
           <a:p>
             <a:fld id="{C3F78080-8D0A-4BE8-A5B4-CB115102D524}" type="datetimeFigureOut">
               <a:rPr lang="en-US" smtClean="0"/>
-              <a:t>2/23/2022</a:t>
+              <a:t>5/26/2022</a:t>
             </a:fld>
             <a:endParaRPr lang="en-US"/>
           </a:p>
@@ -4964,7 +5079,7 @@
           <a:p>
             <a:fld id="{C3F78080-8D0A-4BE8-A5B4-CB115102D524}" type="datetimeFigureOut">
               <a:rPr lang="en-US" smtClean="0"/>
-              <a:t>2/23/2022</a:t>
+              <a:t>5/26/2022</a:t>
             </a:fld>
             <a:endParaRPr lang="en-US"/>
           </a:p>
@@ -5376,7 +5491,7 @@
           <a:p>
             <a:fld id="{C3F78080-8D0A-4BE8-A5B4-CB115102D524}" type="datetimeFigureOut">
               <a:rPr lang="en-US" smtClean="0"/>
-              <a:t>2/23/2022</a:t>
+              <a:t>5/26/2022</a:t>
             </a:fld>
             <a:endParaRPr lang="en-US"/>
           </a:p>
@@ -5517,7 +5632,7 @@
           <a:p>
             <a:fld id="{C3F78080-8D0A-4BE8-A5B4-CB115102D524}" type="datetimeFigureOut">
               <a:rPr lang="en-US" smtClean="0"/>
-              <a:t>2/23/2022</a:t>
+              <a:t>5/26/2022</a:t>
             </a:fld>
             <a:endParaRPr lang="en-US"/>
           </a:p>
@@ -5630,7 +5745,7 @@
           <a:p>
             <a:fld id="{C3F78080-8D0A-4BE8-A5B4-CB115102D524}" type="datetimeFigureOut">
               <a:rPr lang="en-US" smtClean="0"/>
-              <a:t>2/23/2022</a:t>
+              <a:t>5/26/2022</a:t>
             </a:fld>
             <a:endParaRPr lang="en-US"/>
           </a:p>
@@ -5941,7 +6056,7 @@
           <a:p>
             <a:fld id="{C3F78080-8D0A-4BE8-A5B4-CB115102D524}" type="datetimeFigureOut">
               <a:rPr lang="en-US" smtClean="0"/>
-              <a:t>2/23/2022</a:t>
+              <a:t>5/26/2022</a:t>
             </a:fld>
             <a:endParaRPr lang="en-US"/>
           </a:p>
@@ -6229,7 +6344,7 @@
           <a:p>
             <a:fld id="{C3F78080-8D0A-4BE8-A5B4-CB115102D524}" type="datetimeFigureOut">
               <a:rPr lang="en-US" smtClean="0"/>
-              <a:t>2/23/2022</a:t>
+              <a:t>5/26/2022</a:t>
             </a:fld>
             <a:endParaRPr lang="en-US"/>
           </a:p>
@@ -6470,7 +6585,7 @@
           <a:p>
             <a:fld id="{C3F78080-8D0A-4BE8-A5B4-CB115102D524}" type="datetimeFigureOut">
               <a:rPr lang="en-US" smtClean="0"/>
-              <a:t>2/23/2022</a:t>
+              <a:t>5/26/2022</a:t>
             </a:fld>
             <a:endParaRPr lang="en-US"/>
           </a:p>
@@ -7791,6 +7906,197 @@
 </file>
 
 <file path=ppt/slides/slide15.xml><?xml version="1.0" encoding="utf-8"?>
+<p:sld xmlns:a="http://schemas.openxmlformats.org/drawingml/2006/main" xmlns:r="http://schemas.openxmlformats.org/officeDocument/2006/relationships" xmlns:p="http://schemas.openxmlformats.org/presentationml/2006/main">
+  <p:cSld>
+    <p:spTree>
+      <p:nvGrpSpPr>
+        <p:cNvPr id="1" name=""/>
+        <p:cNvGrpSpPr/>
+        <p:nvPr/>
+      </p:nvGrpSpPr>
+      <p:grpSpPr>
+        <a:xfrm>
+          <a:off x="0" y="0"/>
+          <a:ext cx="0" cy="0"/>
+          <a:chOff x="0" y="0"/>
+          <a:chExt cx="0" cy="0"/>
+        </a:xfrm>
+      </p:grpSpPr>
+      <p:sp>
+        <p:nvSpPr>
+          <p:cNvPr id="3" name="Text Placeholder 2">
+            <a:extLst>
+              <a:ext uri="{FF2B5EF4-FFF2-40B4-BE49-F238E27FC236}">
+                <a16:creationId xmlns:a16="http://schemas.microsoft.com/office/drawing/2014/main" id="{098BC2D2-CCF7-4C63-8489-B46BF394FCA2}"/>
+              </a:ext>
+            </a:extLst>
+          </p:cNvPr>
+          <p:cNvSpPr>
+            <a:spLocks noGrp="1"/>
+          </p:cNvSpPr>
+          <p:nvPr>
+            <p:ph type="body" idx="1"/>
+          </p:nvPr>
+        </p:nvSpPr>
+        <p:spPr>
+          <a:xfrm>
+            <a:off x="0" y="4285400"/>
+            <a:ext cx="12192000" cy="518830"/>
+          </a:xfrm>
+        </p:spPr>
+        <p:txBody>
+          <a:bodyPr>
+            <a:normAutofit/>
+          </a:bodyPr>
+          <a:lstStyle/>
+          <a:p>
+            <a:endParaRPr lang="en-US" dirty="0">
+              <a:latin typeface="Palatino Linotype" panose="02040502050505030304" pitchFamily="18" charset="0"/>
+              <a:cs typeface="Segoe UI" panose="020B0502040204020203" pitchFamily="34" charset="0"/>
+            </a:endParaRPr>
+          </a:p>
+          <a:p>
+            <a:endParaRPr lang="en-US" dirty="0">
+              <a:latin typeface="Palatino Linotype" panose="02040502050505030304" pitchFamily="18" charset="0"/>
+              <a:cs typeface="Segoe UI" panose="020B0502040204020203" pitchFamily="34" charset="0"/>
+            </a:endParaRPr>
+          </a:p>
+          <a:p>
+            <a:endParaRPr lang="en-US" dirty="0">
+              <a:latin typeface="Palatino Linotype" panose="02040502050505030304" pitchFamily="18" charset="0"/>
+              <a:cs typeface="Segoe UI" panose="020B0502040204020203" pitchFamily="34" charset="0"/>
+            </a:endParaRPr>
+          </a:p>
+          <a:p>
+            <a:endParaRPr lang="en-US" dirty="0">
+              <a:latin typeface="Palatino Linotype" panose="02040502050505030304" pitchFamily="18" charset="0"/>
+              <a:cs typeface="Segoe UI" panose="020B0502040204020203" pitchFamily="34" charset="0"/>
+            </a:endParaRPr>
+          </a:p>
+          <a:p>
+            <a:endParaRPr lang="en-US" dirty="0">
+              <a:latin typeface="Palatino Linotype" panose="02040502050505030304" pitchFamily="18" charset="0"/>
+              <a:cs typeface="Segoe UI" panose="020B0502040204020203" pitchFamily="34" charset="0"/>
+            </a:endParaRPr>
+          </a:p>
+        </p:txBody>
+      </p:sp>
+      <p:pic>
+        <p:nvPicPr>
+          <p:cNvPr id="6" name="Picture 5">
+            <a:extLst>
+              <a:ext uri="{FF2B5EF4-FFF2-40B4-BE49-F238E27FC236}">
+                <a16:creationId xmlns:a16="http://schemas.microsoft.com/office/drawing/2014/main" id="{4FD57F50-B889-4603-9436-B0404F566685}"/>
+              </a:ext>
+            </a:extLst>
+          </p:cNvPr>
+          <p:cNvPicPr>
+            <a:picLocks noChangeAspect="1"/>
+          </p:cNvPicPr>
+          <p:nvPr/>
+        </p:nvPicPr>
+        <p:blipFill>
+          <a:blip r:embed="rId3"/>
+          <a:stretch>
+            <a:fillRect/>
+          </a:stretch>
+        </p:blipFill>
+        <p:spPr>
+          <a:xfrm>
+            <a:off x="0" y="365760"/>
+            <a:ext cx="3233668" cy="805144"/>
+          </a:xfrm>
+          <a:prstGeom prst="rect">
+            <a:avLst/>
+          </a:prstGeom>
+        </p:spPr>
+      </p:pic>
+      <p:sp>
+        <p:nvSpPr>
+          <p:cNvPr id="5" name="TextBox 4">
+            <a:extLst>
+              <a:ext uri="{FF2B5EF4-FFF2-40B4-BE49-F238E27FC236}">
+                <a16:creationId xmlns:a16="http://schemas.microsoft.com/office/drawing/2014/main" id="{3FB0C709-F873-4998-9262-CCFA219A0026}"/>
+              </a:ext>
+            </a:extLst>
+          </p:cNvPr>
+          <p:cNvSpPr txBox="1"/>
+          <p:nvPr/>
+        </p:nvSpPr>
+        <p:spPr>
+          <a:xfrm>
+            <a:off x="0" y="3291840"/>
+            <a:ext cx="12192000" cy="1200329"/>
+          </a:xfrm>
+          <a:prstGeom prst="rect">
+            <a:avLst/>
+          </a:prstGeom>
+          <a:noFill/>
+        </p:spPr>
+        <p:txBody>
+          <a:bodyPr wrap="square" rtlCol="0">
+            <a:spAutoFit/>
+          </a:bodyPr>
+          <a:lstStyle/>
+          <a:p>
+            <a:pPr algn="ctr"/>
+            <a:r>
+              <a:rPr lang="en-US" sz="3600" dirty="0">
+                <a:solidFill>
+                  <a:schemeClr val="tx1">
+                    <a:lumMod val="65000"/>
+                    <a:lumOff val="35000"/>
+                  </a:schemeClr>
+                </a:solidFill>
+                <a:latin typeface="Palatino Linotype" panose="02040502050505030304" pitchFamily="18" charset="0"/>
+              </a:rPr>
+              <a:t>The MNIST classifier</a:t>
+            </a:r>
+          </a:p>
+          <a:p>
+            <a:pPr algn="ctr"/>
+            <a:r>
+              <a:rPr lang="en-US" sz="3600" dirty="0">
+                <a:solidFill>
+                  <a:schemeClr val="tx1">
+                    <a:lumMod val="65000"/>
+                    <a:lumOff val="35000"/>
+                  </a:schemeClr>
+                </a:solidFill>
+                <a:latin typeface="Palatino Linotype" panose="02040502050505030304" pitchFamily="18" charset="0"/>
+              </a:rPr>
+              <a:t>01_mnist.ipynb</a:t>
+            </a:r>
+            <a:endParaRPr lang="en-US" sz="3600" dirty="0"/>
+          </a:p>
+        </p:txBody>
+      </p:sp>
+    </p:spTree>
+    <p:extLst>
+      <p:ext uri="{BB962C8B-B14F-4D97-AF65-F5344CB8AC3E}">
+        <p14:creationId xmlns:p14="http://schemas.microsoft.com/office/powerpoint/2010/main" val="3202979621"/>
+      </p:ext>
+    </p:extLst>
+  </p:cSld>
+  <p:clrMapOvr>
+    <a:masterClrMapping/>
+  </p:clrMapOvr>
+  <mc:AlternateContent xmlns:mc="http://schemas.openxmlformats.org/markup-compatibility/2006" xmlns:p14="http://schemas.microsoft.com/office/powerpoint/2010/main">
+    <mc:Choice Requires="p14">
+      <p:transition spd="med" p14:dur="700">
+        <p:fade/>
+      </p:transition>
+    </mc:Choice>
+    <mc:Fallback xmlns="">
+      <p:transition spd="med">
+        <p:fade/>
+      </p:transition>
+    </mc:Fallback>
+  </mc:AlternateContent>
+</p:sld>
+</file>
+
+<file path=ppt/slides/slide16.xml><?xml version="1.0" encoding="utf-8"?>
 <p:sld xmlns:a="http://schemas.openxmlformats.org/drawingml/2006/main" xmlns:r="http://schemas.openxmlformats.org/officeDocument/2006/relationships" xmlns:p="http://schemas.openxmlformats.org/presentationml/2006/main">
   <p:cSld>
     <p:spTree>

</xml_diff>

<commit_message>
Added CoLab link to README.
</commit_message>
<xml_diff>
--- a/presentations/01_cnn_intro.pptx
+++ b/presentations/01_cnn_intro.pptx
@@ -23,7 +23,7 @@
     <p:sldId id="323" r:id="rId14"/>
     <p:sldId id="332" r:id="rId15"/>
     <p:sldId id="333" r:id="rId16"/>
-    <p:sldId id="334" r:id="rId17"/>
+    <p:sldId id="354" r:id="rId17"/>
     <p:sldId id="325" r:id="rId18"/>
     <p:sldId id="326" r:id="rId19"/>
     <p:sldId id="324" r:id="rId20"/>
@@ -227,7 +227,7 @@
           <a:p>
             <a:fld id="{FD93C9B2-20F6-4DB1-B471-224337D0AC79}" type="datetimeFigureOut">
               <a:rPr lang="en-US" smtClean="0"/>
-              <a:t>8/26/2022</a:t>
+              <a:t>8/29/2022</a:t>
             </a:fld>
             <a:endParaRPr lang="en-US"/>
           </a:p>
@@ -1534,6 +1534,23 @@
           <a:bodyPr/>
           <a:lstStyle/>
           <a:p>
+            <a:pPr marL="0" marR="0" lvl="0" indent="0" algn="l" defTabSz="914400" rtl="0" eaLnBrk="1" fontAlgn="auto" latinLnBrk="0" hangingPunct="1">
+              <a:lnSpc>
+                <a:spcPct val="100000"/>
+              </a:lnSpc>
+              <a:spcBef>
+                <a:spcPts val="0"/>
+              </a:spcBef>
+              <a:spcAft>
+                <a:spcPts val="0"/>
+              </a:spcAft>
+              <a:buClrTx/>
+              <a:buSzTx/>
+              <a:buFontTx/>
+              <a:buNone/>
+              <a:tabLst/>
+              <a:defRPr/>
+            </a:pPr>
             <a:r>
               <a:rPr lang="en-US" dirty="0">
                 <a:latin typeface="+mn-lt"/>
@@ -1552,6 +1569,11 @@
               </a:rPr>
               <a:t>.</a:t>
             </a:r>
+          </a:p>
+          <a:p>
+            <a:endParaRPr lang="en-US" dirty="0">
+              <a:latin typeface="+mn-lt"/>
+            </a:endParaRPr>
           </a:p>
           <a:p>
             <a:endParaRPr lang="en-US" dirty="0">
@@ -4474,7 +4496,7 @@
           <a:p>
             <a:fld id="{C3F78080-8D0A-4BE8-A5B4-CB115102D524}" type="datetimeFigureOut">
               <a:rPr lang="en-US" smtClean="0"/>
-              <a:t>8/26/2022</a:t>
+              <a:t>8/29/2022</a:t>
             </a:fld>
             <a:endParaRPr lang="en-US"/>
           </a:p>
@@ -4672,7 +4694,7 @@
           <a:p>
             <a:fld id="{C3F78080-8D0A-4BE8-A5B4-CB115102D524}" type="datetimeFigureOut">
               <a:rPr lang="en-US" smtClean="0"/>
-              <a:t>8/26/2022</a:t>
+              <a:t>8/29/2022</a:t>
             </a:fld>
             <a:endParaRPr lang="en-US"/>
           </a:p>
@@ -4880,7 +4902,7 @@
           <a:p>
             <a:fld id="{C3F78080-8D0A-4BE8-A5B4-CB115102D524}" type="datetimeFigureOut">
               <a:rPr lang="en-US" smtClean="0"/>
-              <a:t>8/26/2022</a:t>
+              <a:t>8/29/2022</a:t>
             </a:fld>
             <a:endParaRPr lang="en-US"/>
           </a:p>
@@ -5078,7 +5100,7 @@
           <a:p>
             <a:fld id="{C3F78080-8D0A-4BE8-A5B4-CB115102D524}" type="datetimeFigureOut">
               <a:rPr lang="en-US" smtClean="0"/>
-              <a:t>8/26/2022</a:t>
+              <a:t>8/29/2022</a:t>
             </a:fld>
             <a:endParaRPr lang="en-US"/>
           </a:p>
@@ -5353,7 +5375,7 @@
           <a:p>
             <a:fld id="{C3F78080-8D0A-4BE8-A5B4-CB115102D524}" type="datetimeFigureOut">
               <a:rPr lang="en-US" smtClean="0"/>
-              <a:t>8/26/2022</a:t>
+              <a:t>8/29/2022</a:t>
             </a:fld>
             <a:endParaRPr lang="en-US"/>
           </a:p>
@@ -5618,7 +5640,7 @@
           <a:p>
             <a:fld id="{C3F78080-8D0A-4BE8-A5B4-CB115102D524}" type="datetimeFigureOut">
               <a:rPr lang="en-US" smtClean="0"/>
-              <a:t>8/26/2022</a:t>
+              <a:t>8/29/2022</a:t>
             </a:fld>
             <a:endParaRPr lang="en-US"/>
           </a:p>
@@ -6030,7 +6052,7 @@
           <a:p>
             <a:fld id="{C3F78080-8D0A-4BE8-A5B4-CB115102D524}" type="datetimeFigureOut">
               <a:rPr lang="en-US" smtClean="0"/>
-              <a:t>8/26/2022</a:t>
+              <a:t>8/29/2022</a:t>
             </a:fld>
             <a:endParaRPr lang="en-US"/>
           </a:p>
@@ -6171,7 +6193,7 @@
           <a:p>
             <a:fld id="{C3F78080-8D0A-4BE8-A5B4-CB115102D524}" type="datetimeFigureOut">
               <a:rPr lang="en-US" smtClean="0"/>
-              <a:t>8/26/2022</a:t>
+              <a:t>8/29/2022</a:t>
             </a:fld>
             <a:endParaRPr lang="en-US"/>
           </a:p>
@@ -6284,7 +6306,7 @@
           <a:p>
             <a:fld id="{C3F78080-8D0A-4BE8-A5B4-CB115102D524}" type="datetimeFigureOut">
               <a:rPr lang="en-US" smtClean="0"/>
-              <a:t>8/26/2022</a:t>
+              <a:t>8/29/2022</a:t>
             </a:fld>
             <a:endParaRPr lang="en-US"/>
           </a:p>
@@ -6595,7 +6617,7 @@
           <a:p>
             <a:fld id="{C3F78080-8D0A-4BE8-A5B4-CB115102D524}" type="datetimeFigureOut">
               <a:rPr lang="en-US" smtClean="0"/>
-              <a:t>8/26/2022</a:t>
+              <a:t>8/29/2022</a:t>
             </a:fld>
             <a:endParaRPr lang="en-US"/>
           </a:p>
@@ -6883,7 +6905,7 @@
           <a:p>
             <a:fld id="{C3F78080-8D0A-4BE8-A5B4-CB115102D524}" type="datetimeFigureOut">
               <a:rPr lang="en-US" smtClean="0"/>
-              <a:t>8/26/2022</a:t>
+              <a:t>8/29/2022</a:t>
             </a:fld>
             <a:endParaRPr lang="en-US"/>
           </a:p>
@@ -7124,7 +7146,7 @@
           <a:p>
             <a:fld id="{C3F78080-8D0A-4BE8-A5B4-CB115102D524}" type="datetimeFigureOut">
               <a:rPr lang="en-US" smtClean="0"/>
-              <a:t>8/26/2022</a:t>
+              <a:t>8/29/2022</a:t>
             </a:fld>
             <a:endParaRPr lang="en-US"/>
           </a:p>
@@ -10226,384 +10248,12 @@
           </a:prstGeom>
         </p:spPr>
       </p:pic>
-      <p:grpSp>
-        <p:nvGrpSpPr>
-          <p:cNvPr id="5" name="Group 4">
+      <p:sp>
+        <p:nvSpPr>
+          <p:cNvPr id="19" name="Freeform 18">
             <a:extLst>
               <a:ext uri="{FF2B5EF4-FFF2-40B4-BE49-F238E27FC236}">
-                <a16:creationId xmlns:a16="http://schemas.microsoft.com/office/drawing/2014/main" id="{2FCC3C6A-15BB-5E24-BCA1-8F84EEB9B392}"/>
-              </a:ext>
-            </a:extLst>
-          </p:cNvPr>
-          <p:cNvGrpSpPr/>
-          <p:nvPr/>
-        </p:nvGrpSpPr>
-        <p:grpSpPr>
-          <a:xfrm>
-            <a:off x="5208489" y="2824654"/>
-            <a:ext cx="1802521" cy="1636890"/>
-            <a:chOff x="5422366" y="3014133"/>
-            <a:chExt cx="1802521" cy="1636890"/>
-          </a:xfrm>
-          <a:solidFill>
-            <a:srgbClr val="417AAC"/>
-          </a:solidFill>
-        </p:grpSpPr>
-        <p:sp>
-          <p:nvSpPr>
-            <p:cNvPr id="2" name="Rectangle 1">
-              <a:extLst>
-                <a:ext uri="{FF2B5EF4-FFF2-40B4-BE49-F238E27FC236}">
-                  <a16:creationId xmlns:a16="http://schemas.microsoft.com/office/drawing/2014/main" id="{A6A4075A-0FCA-DB1A-4E88-99B559648BD1}"/>
-                </a:ext>
-              </a:extLst>
-            </p:cNvPr>
-            <p:cNvSpPr/>
-            <p:nvPr/>
-          </p:nvSpPr>
-          <p:spPr>
-            <a:xfrm>
-              <a:off x="5422367" y="3014133"/>
-              <a:ext cx="323676" cy="1636890"/>
-            </a:xfrm>
-            <a:prstGeom prst="rect">
-              <a:avLst/>
-            </a:prstGeom>
-            <a:grpFill/>
-            <a:ln>
-              <a:noFill/>
-            </a:ln>
-          </p:spPr>
-          <p:style>
-            <a:lnRef idx="2">
-              <a:schemeClr val="accent1">
-                <a:shade val="50000"/>
-              </a:schemeClr>
-            </a:lnRef>
-            <a:fillRef idx="1">
-              <a:schemeClr val="accent1"/>
-            </a:fillRef>
-            <a:effectRef idx="0">
-              <a:schemeClr val="accent1"/>
-            </a:effectRef>
-            <a:fontRef idx="minor">
-              <a:schemeClr val="lt1"/>
-            </a:fontRef>
-          </p:style>
-          <p:txBody>
-            <a:bodyPr rtlCol="0" anchor="ctr"/>
-            <a:lstStyle/>
-            <a:p>
-              <a:pPr algn="ctr"/>
-              <a:endParaRPr lang="en-US" dirty="0"/>
-            </a:p>
-          </p:txBody>
-        </p:sp>
-        <p:sp>
-          <p:nvSpPr>
-            <p:cNvPr id="3" name="Rectangle 2">
-              <a:extLst>
-                <a:ext uri="{FF2B5EF4-FFF2-40B4-BE49-F238E27FC236}">
-                  <a16:creationId xmlns:a16="http://schemas.microsoft.com/office/drawing/2014/main" id="{D76969CF-2C54-103C-28EB-6B00F021D050}"/>
-                </a:ext>
-              </a:extLst>
-            </p:cNvPr>
-            <p:cNvSpPr/>
-            <p:nvPr/>
-          </p:nvSpPr>
-          <p:spPr>
-            <a:xfrm rot="5400000">
-              <a:off x="6183927" y="2342883"/>
-              <a:ext cx="279400" cy="1802521"/>
-            </a:xfrm>
-            <a:prstGeom prst="rect">
-              <a:avLst/>
-            </a:prstGeom>
-            <a:grpFill/>
-            <a:ln>
-              <a:noFill/>
-            </a:ln>
-          </p:spPr>
-          <p:style>
-            <a:lnRef idx="2">
-              <a:schemeClr val="accent1">
-                <a:shade val="50000"/>
-              </a:schemeClr>
-            </a:lnRef>
-            <a:fillRef idx="1">
-              <a:schemeClr val="accent1"/>
-            </a:fillRef>
-            <a:effectRef idx="0">
-              <a:schemeClr val="accent1"/>
-            </a:effectRef>
-            <a:fontRef idx="minor">
-              <a:schemeClr val="lt1"/>
-            </a:fontRef>
-          </p:style>
-          <p:txBody>
-            <a:bodyPr rtlCol="0" anchor="ctr"/>
-            <a:lstStyle/>
-            <a:p>
-              <a:pPr algn="ctr"/>
-              <a:endParaRPr lang="en-US" dirty="0"/>
-            </a:p>
-          </p:txBody>
-        </p:sp>
-      </p:grpSp>
-      <p:grpSp>
-        <p:nvGrpSpPr>
-          <p:cNvPr id="6" name="Group 5">
-            <a:extLst>
-              <a:ext uri="{FF2B5EF4-FFF2-40B4-BE49-F238E27FC236}">
-                <a16:creationId xmlns:a16="http://schemas.microsoft.com/office/drawing/2014/main" id="{395E8A0B-7406-76E0-A9F5-350962BB9724}"/>
-              </a:ext>
-            </a:extLst>
-          </p:cNvPr>
-          <p:cNvGrpSpPr/>
-          <p:nvPr/>
-        </p:nvGrpSpPr>
-        <p:grpSpPr>
-          <a:xfrm>
-            <a:off x="5275431" y="2882398"/>
-            <a:ext cx="1802521" cy="1636890"/>
-            <a:chOff x="5422366" y="3014133"/>
-            <a:chExt cx="1802521" cy="1636890"/>
-          </a:xfrm>
-          <a:solidFill>
-            <a:srgbClr val="417AAC"/>
-          </a:solidFill>
-        </p:grpSpPr>
-        <p:sp>
-          <p:nvSpPr>
-            <p:cNvPr id="7" name="Rectangle 6">
-              <a:extLst>
-                <a:ext uri="{FF2B5EF4-FFF2-40B4-BE49-F238E27FC236}">
-                  <a16:creationId xmlns:a16="http://schemas.microsoft.com/office/drawing/2014/main" id="{CB90166F-546D-C020-1058-820AB5EB1FEC}"/>
-                </a:ext>
-              </a:extLst>
-            </p:cNvPr>
-            <p:cNvSpPr/>
-            <p:nvPr/>
-          </p:nvSpPr>
-          <p:spPr>
-            <a:xfrm>
-              <a:off x="5422367" y="3014133"/>
-              <a:ext cx="323676" cy="1636890"/>
-            </a:xfrm>
-            <a:prstGeom prst="rect">
-              <a:avLst/>
-            </a:prstGeom>
-            <a:grpFill/>
-            <a:ln>
-              <a:noFill/>
-            </a:ln>
-          </p:spPr>
-          <p:style>
-            <a:lnRef idx="2">
-              <a:schemeClr val="accent1">
-                <a:shade val="50000"/>
-              </a:schemeClr>
-            </a:lnRef>
-            <a:fillRef idx="1">
-              <a:schemeClr val="accent1"/>
-            </a:fillRef>
-            <a:effectRef idx="0">
-              <a:schemeClr val="accent1"/>
-            </a:effectRef>
-            <a:fontRef idx="minor">
-              <a:schemeClr val="lt1"/>
-            </a:fontRef>
-          </p:style>
-          <p:txBody>
-            <a:bodyPr rtlCol="0" anchor="ctr"/>
-            <a:lstStyle/>
-            <a:p>
-              <a:pPr algn="ctr"/>
-              <a:endParaRPr lang="en-US" dirty="0"/>
-            </a:p>
-          </p:txBody>
-        </p:sp>
-        <p:sp>
-          <p:nvSpPr>
-            <p:cNvPr id="8" name="Rectangle 7">
-              <a:extLst>
-                <a:ext uri="{FF2B5EF4-FFF2-40B4-BE49-F238E27FC236}">
-                  <a16:creationId xmlns:a16="http://schemas.microsoft.com/office/drawing/2014/main" id="{D82E1631-97D2-C440-A41B-2EB32C0A6843}"/>
-                </a:ext>
-              </a:extLst>
-            </p:cNvPr>
-            <p:cNvSpPr/>
-            <p:nvPr/>
-          </p:nvSpPr>
-          <p:spPr>
-            <a:xfrm rot="5400000">
-              <a:off x="6183927" y="2342883"/>
-              <a:ext cx="279400" cy="1802521"/>
-            </a:xfrm>
-            <a:prstGeom prst="rect">
-              <a:avLst/>
-            </a:prstGeom>
-            <a:grpFill/>
-            <a:ln>
-              <a:noFill/>
-            </a:ln>
-          </p:spPr>
-          <p:style>
-            <a:lnRef idx="2">
-              <a:schemeClr val="accent1">
-                <a:shade val="50000"/>
-              </a:schemeClr>
-            </a:lnRef>
-            <a:fillRef idx="1">
-              <a:schemeClr val="accent1"/>
-            </a:fillRef>
-            <a:effectRef idx="0">
-              <a:schemeClr val="accent1"/>
-            </a:effectRef>
-            <a:fontRef idx="minor">
-              <a:schemeClr val="lt1"/>
-            </a:fontRef>
-          </p:style>
-          <p:txBody>
-            <a:bodyPr rtlCol="0" anchor="ctr"/>
-            <a:lstStyle/>
-            <a:p>
-              <a:pPr algn="ctr"/>
-              <a:endParaRPr lang="en-US" dirty="0"/>
-            </a:p>
-          </p:txBody>
-        </p:sp>
-      </p:grpSp>
-      <p:grpSp>
-        <p:nvGrpSpPr>
-          <p:cNvPr id="9" name="Group 8">
-            <a:extLst>
-              <a:ext uri="{FF2B5EF4-FFF2-40B4-BE49-F238E27FC236}">
-                <a16:creationId xmlns:a16="http://schemas.microsoft.com/office/drawing/2014/main" id="{69210F7A-A1AB-E1BF-05F6-7C34B72FEB29}"/>
-              </a:ext>
-            </a:extLst>
-          </p:cNvPr>
-          <p:cNvGrpSpPr/>
-          <p:nvPr/>
-        </p:nvGrpSpPr>
-        <p:grpSpPr>
-          <a:xfrm>
-            <a:off x="5356124" y="2953892"/>
-            <a:ext cx="1802521" cy="1636890"/>
-            <a:chOff x="5422366" y="3014133"/>
-            <a:chExt cx="1802521" cy="1636890"/>
-          </a:xfrm>
-          <a:solidFill>
-            <a:srgbClr val="417AAC"/>
-          </a:solidFill>
-        </p:grpSpPr>
-        <p:sp>
-          <p:nvSpPr>
-            <p:cNvPr id="10" name="Rectangle 9">
-              <a:extLst>
-                <a:ext uri="{FF2B5EF4-FFF2-40B4-BE49-F238E27FC236}">
-                  <a16:creationId xmlns:a16="http://schemas.microsoft.com/office/drawing/2014/main" id="{DBCA00A6-EA8B-4719-3DD2-00CE85128C4E}"/>
-                </a:ext>
-              </a:extLst>
-            </p:cNvPr>
-            <p:cNvSpPr/>
-            <p:nvPr/>
-          </p:nvSpPr>
-          <p:spPr>
-            <a:xfrm>
-              <a:off x="5422367" y="3014133"/>
-              <a:ext cx="323676" cy="1636890"/>
-            </a:xfrm>
-            <a:prstGeom prst="rect">
-              <a:avLst/>
-            </a:prstGeom>
-            <a:grpFill/>
-            <a:ln>
-              <a:noFill/>
-            </a:ln>
-          </p:spPr>
-          <p:style>
-            <a:lnRef idx="2">
-              <a:schemeClr val="accent1">
-                <a:shade val="50000"/>
-              </a:schemeClr>
-            </a:lnRef>
-            <a:fillRef idx="1">
-              <a:schemeClr val="accent1"/>
-            </a:fillRef>
-            <a:effectRef idx="0">
-              <a:schemeClr val="accent1"/>
-            </a:effectRef>
-            <a:fontRef idx="minor">
-              <a:schemeClr val="lt1"/>
-            </a:fontRef>
-          </p:style>
-          <p:txBody>
-            <a:bodyPr rtlCol="0" anchor="ctr"/>
-            <a:lstStyle/>
-            <a:p>
-              <a:pPr algn="ctr"/>
-              <a:endParaRPr lang="en-US" dirty="0"/>
-            </a:p>
-          </p:txBody>
-        </p:sp>
-        <p:sp>
-          <p:nvSpPr>
-            <p:cNvPr id="11" name="Rectangle 10">
-              <a:extLst>
-                <a:ext uri="{FF2B5EF4-FFF2-40B4-BE49-F238E27FC236}">
-                  <a16:creationId xmlns:a16="http://schemas.microsoft.com/office/drawing/2014/main" id="{33E53E4E-6225-D3B1-5521-095010D698A5}"/>
-                </a:ext>
-              </a:extLst>
-            </p:cNvPr>
-            <p:cNvSpPr/>
-            <p:nvPr/>
-          </p:nvSpPr>
-          <p:spPr>
-            <a:xfrm rot="5400000">
-              <a:off x="6183927" y="2342883"/>
-              <a:ext cx="279400" cy="1802521"/>
-            </a:xfrm>
-            <a:prstGeom prst="rect">
-              <a:avLst/>
-            </a:prstGeom>
-            <a:grpFill/>
-            <a:ln>
-              <a:noFill/>
-            </a:ln>
-          </p:spPr>
-          <p:style>
-            <a:lnRef idx="2">
-              <a:schemeClr val="accent1">
-                <a:shade val="50000"/>
-              </a:schemeClr>
-            </a:lnRef>
-            <a:fillRef idx="1">
-              <a:schemeClr val="accent1"/>
-            </a:fillRef>
-            <a:effectRef idx="0">
-              <a:schemeClr val="accent1"/>
-            </a:effectRef>
-            <a:fontRef idx="minor">
-              <a:schemeClr val="lt1"/>
-            </a:fontRef>
-          </p:style>
-          <p:txBody>
-            <a:bodyPr rtlCol="0" anchor="ctr"/>
-            <a:lstStyle/>
-            <a:p>
-              <a:pPr algn="ctr"/>
-              <a:endParaRPr lang="en-US" dirty="0"/>
-            </a:p>
-          </p:txBody>
-        </p:sp>
-      </p:grpSp>
-      <p:sp>
-        <p:nvSpPr>
-          <p:cNvPr id="12" name="Rectangle 11">
-            <a:extLst>
-              <a:ext uri="{FF2B5EF4-FFF2-40B4-BE49-F238E27FC236}">
-                <a16:creationId xmlns:a16="http://schemas.microsoft.com/office/drawing/2014/main" id="{2E982ABC-E21C-2528-25D2-134519AA921B}"/>
+                <a16:creationId xmlns:a16="http://schemas.microsoft.com/office/drawing/2014/main" id="{27EB33A9-5023-F140-C566-7C15F0AEA296}"/>
               </a:ext>
             </a:extLst>
           </p:cNvPr>
@@ -10612,17 +10262,86 @@
         </p:nvSpPr>
         <p:spPr>
           <a:xfrm>
-            <a:off x="5693308" y="3306929"/>
-            <a:ext cx="1550193" cy="1418874"/>
+            <a:off x="5344038" y="3006022"/>
+            <a:ext cx="1505749" cy="1390764"/>
           </a:xfrm>
-          <a:prstGeom prst="rect">
+          <a:custGeom>
             <a:avLst/>
-          </a:prstGeom>
+            <a:gdLst>
+              <a:gd name="connsiteX0" fmla="*/ 104034 w 1505749"/>
+              <a:gd name="connsiteY0" fmla="*/ 1275779 h 1319583"/>
+              <a:gd name="connsiteX1" fmla="*/ 104034 w 1505749"/>
+              <a:gd name="connsiteY1" fmla="*/ 98558 h 1319583"/>
+              <a:gd name="connsiteX2" fmla="*/ 1505749 w 1505749"/>
+              <a:gd name="connsiteY2" fmla="*/ 98558 h 1319583"/>
+              <a:gd name="connsiteX3" fmla="*/ 1500273 w 1505749"/>
+              <a:gd name="connsiteY3" fmla="*/ 0 h 1319583"/>
+              <a:gd name="connsiteX4" fmla="*/ 0 w 1505749"/>
+              <a:gd name="connsiteY4" fmla="*/ 0 h 1319583"/>
+              <a:gd name="connsiteX5" fmla="*/ 0 w 1505749"/>
+              <a:gd name="connsiteY5" fmla="*/ 1319583 h 1319583"/>
+              <a:gd name="connsiteX6" fmla="*/ 104034 w 1505749"/>
+              <a:gd name="connsiteY6" fmla="*/ 1275779 h 1319583"/>
+            </a:gdLst>
+            <a:ahLst/>
+            <a:cxnLst>
+              <a:cxn ang="0">
+                <a:pos x="connsiteX0" y="connsiteY0"/>
+              </a:cxn>
+              <a:cxn ang="0">
+                <a:pos x="connsiteX1" y="connsiteY1"/>
+              </a:cxn>
+              <a:cxn ang="0">
+                <a:pos x="connsiteX2" y="connsiteY2"/>
+              </a:cxn>
+              <a:cxn ang="0">
+                <a:pos x="connsiteX3" y="connsiteY3"/>
+              </a:cxn>
+              <a:cxn ang="0">
+                <a:pos x="connsiteX4" y="connsiteY4"/>
+              </a:cxn>
+              <a:cxn ang="0">
+                <a:pos x="connsiteX5" y="connsiteY5"/>
+              </a:cxn>
+              <a:cxn ang="0">
+                <a:pos x="connsiteX6" y="connsiteY6"/>
+              </a:cxn>
+            </a:cxnLst>
+            <a:rect l="l" t="t" r="r" b="b"/>
+            <a:pathLst>
+              <a:path w="1505749" h="1319583">
+                <a:moveTo>
+                  <a:pt x="104034" y="1275779"/>
+                </a:moveTo>
+                <a:lnTo>
+                  <a:pt x="104034" y="98558"/>
+                </a:lnTo>
+                <a:lnTo>
+                  <a:pt x="1505749" y="98558"/>
+                </a:lnTo>
+                <a:lnTo>
+                  <a:pt x="1500273" y="0"/>
+                </a:lnTo>
+                <a:lnTo>
+                  <a:pt x="0" y="0"/>
+                </a:lnTo>
+                <a:lnTo>
+                  <a:pt x="0" y="1319583"/>
+                </a:lnTo>
+                <a:lnTo>
+                  <a:pt x="104034" y="1275779"/>
+                </a:lnTo>
+                <a:close/>
+              </a:path>
+            </a:pathLst>
+          </a:custGeom>
           <a:solidFill>
             <a:srgbClr val="417AAC"/>
           </a:solidFill>
           <a:ln>
-            <a:noFill/>
+            <a:solidFill>
+              <a:srgbClr val="417AAC"/>
+            </a:solidFill>
           </a:ln>
         </p:spPr>
         <p:style>
@@ -10646,138 +10365,552 @@
           <a:lstStyle/>
           <a:p>
             <a:pPr algn="ctr"/>
-            <a:endParaRPr lang="en-US"/>
+            <a:endParaRPr lang="en-US" dirty="0"/>
           </a:p>
         </p:txBody>
       </p:sp>
-      <p:grpSp>
-        <p:nvGrpSpPr>
-          <p:cNvPr id="13" name="Group 12">
+      <p:sp>
+        <p:nvSpPr>
+          <p:cNvPr id="20" name="Freeform 19">
             <a:extLst>
               <a:ext uri="{FF2B5EF4-FFF2-40B4-BE49-F238E27FC236}">
-                <a16:creationId xmlns:a16="http://schemas.microsoft.com/office/drawing/2014/main" id="{3AF4C966-7248-0544-EA41-42074CC17EA6}"/>
+                <a16:creationId xmlns:a16="http://schemas.microsoft.com/office/drawing/2014/main" id="{608BB287-5FC9-D176-6A9E-D68FD4D7C937}"/>
               </a:ext>
             </a:extLst>
           </p:cNvPr>
-          <p:cNvGrpSpPr/>
+          <p:cNvSpPr/>
           <p:nvPr/>
-        </p:nvGrpSpPr>
-        <p:grpSpPr>
+        </p:nvSpPr>
+        <p:spPr>
           <a:xfrm>
-            <a:off x="5443955" y="3027528"/>
-            <a:ext cx="1802521" cy="1636890"/>
-            <a:chOff x="5422366" y="3014133"/>
-            <a:chExt cx="1802521" cy="1636890"/>
+            <a:off x="5419782" y="3076291"/>
+            <a:ext cx="1505749" cy="1390764"/>
           </a:xfrm>
+          <a:custGeom>
+            <a:avLst/>
+            <a:gdLst>
+              <a:gd name="connsiteX0" fmla="*/ 104034 w 1505749"/>
+              <a:gd name="connsiteY0" fmla="*/ 1275779 h 1319583"/>
+              <a:gd name="connsiteX1" fmla="*/ 104034 w 1505749"/>
+              <a:gd name="connsiteY1" fmla="*/ 98558 h 1319583"/>
+              <a:gd name="connsiteX2" fmla="*/ 1505749 w 1505749"/>
+              <a:gd name="connsiteY2" fmla="*/ 98558 h 1319583"/>
+              <a:gd name="connsiteX3" fmla="*/ 1500273 w 1505749"/>
+              <a:gd name="connsiteY3" fmla="*/ 0 h 1319583"/>
+              <a:gd name="connsiteX4" fmla="*/ 0 w 1505749"/>
+              <a:gd name="connsiteY4" fmla="*/ 0 h 1319583"/>
+              <a:gd name="connsiteX5" fmla="*/ 0 w 1505749"/>
+              <a:gd name="connsiteY5" fmla="*/ 1319583 h 1319583"/>
+              <a:gd name="connsiteX6" fmla="*/ 104034 w 1505749"/>
+              <a:gd name="connsiteY6" fmla="*/ 1275779 h 1319583"/>
+            </a:gdLst>
+            <a:ahLst/>
+            <a:cxnLst>
+              <a:cxn ang="0">
+                <a:pos x="connsiteX0" y="connsiteY0"/>
+              </a:cxn>
+              <a:cxn ang="0">
+                <a:pos x="connsiteX1" y="connsiteY1"/>
+              </a:cxn>
+              <a:cxn ang="0">
+                <a:pos x="connsiteX2" y="connsiteY2"/>
+              </a:cxn>
+              <a:cxn ang="0">
+                <a:pos x="connsiteX3" y="connsiteY3"/>
+              </a:cxn>
+              <a:cxn ang="0">
+                <a:pos x="connsiteX4" y="connsiteY4"/>
+              </a:cxn>
+              <a:cxn ang="0">
+                <a:pos x="connsiteX5" y="connsiteY5"/>
+              </a:cxn>
+              <a:cxn ang="0">
+                <a:pos x="connsiteX6" y="connsiteY6"/>
+              </a:cxn>
+            </a:cxnLst>
+            <a:rect l="l" t="t" r="r" b="b"/>
+            <a:pathLst>
+              <a:path w="1505749" h="1319583">
+                <a:moveTo>
+                  <a:pt x="104034" y="1275779"/>
+                </a:moveTo>
+                <a:lnTo>
+                  <a:pt x="104034" y="98558"/>
+                </a:lnTo>
+                <a:lnTo>
+                  <a:pt x="1505749" y="98558"/>
+                </a:lnTo>
+                <a:lnTo>
+                  <a:pt x="1500273" y="0"/>
+                </a:lnTo>
+                <a:lnTo>
+                  <a:pt x="0" y="0"/>
+                </a:lnTo>
+                <a:lnTo>
+                  <a:pt x="0" y="1319583"/>
+                </a:lnTo>
+                <a:lnTo>
+                  <a:pt x="104034" y="1275779"/>
+                </a:lnTo>
+                <a:close/>
+              </a:path>
+            </a:pathLst>
+          </a:custGeom>
           <a:solidFill>
             <a:srgbClr val="417AAC"/>
           </a:solidFill>
-        </p:grpSpPr>
-        <p:sp>
-          <p:nvSpPr>
-            <p:cNvPr id="14" name="Rectangle 13">
-              <a:extLst>
-                <a:ext uri="{FF2B5EF4-FFF2-40B4-BE49-F238E27FC236}">
-                  <a16:creationId xmlns:a16="http://schemas.microsoft.com/office/drawing/2014/main" id="{75B1AA16-1111-D0A3-F444-0C6EF31CD575}"/>
-                </a:ext>
-              </a:extLst>
-            </p:cNvPr>
-            <p:cNvSpPr/>
-            <p:nvPr/>
-          </p:nvSpPr>
-          <p:spPr>
-            <a:xfrm>
-              <a:off x="5422367" y="3014133"/>
-              <a:ext cx="323676" cy="1636890"/>
-            </a:xfrm>
-            <a:prstGeom prst="rect">
-              <a:avLst/>
-            </a:prstGeom>
-            <a:grpFill/>
-            <a:ln>
-              <a:noFill/>
-            </a:ln>
-          </p:spPr>
-          <p:style>
-            <a:lnRef idx="2">
-              <a:schemeClr val="accent1">
-                <a:shade val="50000"/>
-              </a:schemeClr>
-            </a:lnRef>
-            <a:fillRef idx="1">
-              <a:schemeClr val="accent1"/>
-            </a:fillRef>
-            <a:effectRef idx="0">
-              <a:schemeClr val="accent1"/>
-            </a:effectRef>
-            <a:fontRef idx="minor">
-              <a:schemeClr val="lt1"/>
-            </a:fontRef>
-          </p:style>
-          <p:txBody>
-            <a:bodyPr rtlCol="0" anchor="ctr"/>
-            <a:lstStyle/>
-            <a:p>
-              <a:pPr algn="ctr"/>
-              <a:endParaRPr lang="en-US" dirty="0"/>
-            </a:p>
-          </p:txBody>
-        </p:sp>
-        <p:sp>
-          <p:nvSpPr>
-            <p:cNvPr id="15" name="Rectangle 14">
-              <a:extLst>
-                <a:ext uri="{FF2B5EF4-FFF2-40B4-BE49-F238E27FC236}">
-                  <a16:creationId xmlns:a16="http://schemas.microsoft.com/office/drawing/2014/main" id="{43E9BD78-5F15-0966-9B93-91DDE5B6DC40}"/>
-                </a:ext>
-              </a:extLst>
-            </p:cNvPr>
-            <p:cNvSpPr/>
-            <p:nvPr/>
-          </p:nvSpPr>
-          <p:spPr>
-            <a:xfrm rot="5400000">
-              <a:off x="6183927" y="2342883"/>
-              <a:ext cx="279400" cy="1802521"/>
-            </a:xfrm>
-            <a:prstGeom prst="rect">
-              <a:avLst/>
-            </a:prstGeom>
-            <a:grpFill/>
-            <a:ln>
-              <a:noFill/>
-            </a:ln>
-          </p:spPr>
-          <p:style>
-            <a:lnRef idx="2">
-              <a:schemeClr val="accent1">
-                <a:shade val="50000"/>
-              </a:schemeClr>
-            </a:lnRef>
-            <a:fillRef idx="1">
-              <a:schemeClr val="accent1"/>
-            </a:fillRef>
-            <a:effectRef idx="0">
-              <a:schemeClr val="accent1"/>
-            </a:effectRef>
-            <a:fontRef idx="minor">
-              <a:schemeClr val="lt1"/>
-            </a:fontRef>
-          </p:style>
-          <p:txBody>
-            <a:bodyPr rtlCol="0" anchor="ctr"/>
-            <a:lstStyle/>
-            <a:p>
-              <a:pPr algn="ctr"/>
-              <a:endParaRPr lang="en-US" dirty="0"/>
-            </a:p>
-          </p:txBody>
-        </p:sp>
-      </p:grpSp>
+          <a:ln>
+            <a:solidFill>
+              <a:srgbClr val="417AAC"/>
+            </a:solidFill>
+          </a:ln>
+        </p:spPr>
+        <p:style>
+          <a:lnRef idx="2">
+            <a:schemeClr val="accent1">
+              <a:shade val="50000"/>
+            </a:schemeClr>
+          </a:lnRef>
+          <a:fillRef idx="1">
+            <a:schemeClr val="accent1"/>
+          </a:fillRef>
+          <a:effectRef idx="0">
+            <a:schemeClr val="accent1"/>
+          </a:effectRef>
+          <a:fontRef idx="minor">
+            <a:schemeClr val="lt1"/>
+          </a:fontRef>
+        </p:style>
+        <p:txBody>
+          <a:bodyPr rtlCol="0" anchor="ctr"/>
+          <a:lstStyle/>
+          <a:p>
+            <a:pPr algn="ctr"/>
+            <a:endParaRPr lang="en-US" dirty="0"/>
+          </a:p>
+        </p:txBody>
+      </p:sp>
+      <p:sp>
+        <p:nvSpPr>
+          <p:cNvPr id="21" name="Freeform 20">
+            <a:extLst>
+              <a:ext uri="{FF2B5EF4-FFF2-40B4-BE49-F238E27FC236}">
+                <a16:creationId xmlns:a16="http://schemas.microsoft.com/office/drawing/2014/main" id="{E27A2EB6-8C74-D585-69E9-A7C7296B8493}"/>
+              </a:ext>
+            </a:extLst>
+          </p:cNvPr>
+          <p:cNvSpPr/>
+          <p:nvPr/>
+        </p:nvSpPr>
+        <p:spPr>
+          <a:xfrm>
+            <a:off x="5495526" y="3146560"/>
+            <a:ext cx="1505749" cy="1390764"/>
+          </a:xfrm>
+          <a:custGeom>
+            <a:avLst/>
+            <a:gdLst>
+              <a:gd name="connsiteX0" fmla="*/ 104034 w 1505749"/>
+              <a:gd name="connsiteY0" fmla="*/ 1275779 h 1319583"/>
+              <a:gd name="connsiteX1" fmla="*/ 104034 w 1505749"/>
+              <a:gd name="connsiteY1" fmla="*/ 98558 h 1319583"/>
+              <a:gd name="connsiteX2" fmla="*/ 1505749 w 1505749"/>
+              <a:gd name="connsiteY2" fmla="*/ 98558 h 1319583"/>
+              <a:gd name="connsiteX3" fmla="*/ 1500273 w 1505749"/>
+              <a:gd name="connsiteY3" fmla="*/ 0 h 1319583"/>
+              <a:gd name="connsiteX4" fmla="*/ 0 w 1505749"/>
+              <a:gd name="connsiteY4" fmla="*/ 0 h 1319583"/>
+              <a:gd name="connsiteX5" fmla="*/ 0 w 1505749"/>
+              <a:gd name="connsiteY5" fmla="*/ 1319583 h 1319583"/>
+              <a:gd name="connsiteX6" fmla="*/ 104034 w 1505749"/>
+              <a:gd name="connsiteY6" fmla="*/ 1275779 h 1319583"/>
+            </a:gdLst>
+            <a:ahLst/>
+            <a:cxnLst>
+              <a:cxn ang="0">
+                <a:pos x="connsiteX0" y="connsiteY0"/>
+              </a:cxn>
+              <a:cxn ang="0">
+                <a:pos x="connsiteX1" y="connsiteY1"/>
+              </a:cxn>
+              <a:cxn ang="0">
+                <a:pos x="connsiteX2" y="connsiteY2"/>
+              </a:cxn>
+              <a:cxn ang="0">
+                <a:pos x="connsiteX3" y="connsiteY3"/>
+              </a:cxn>
+              <a:cxn ang="0">
+                <a:pos x="connsiteX4" y="connsiteY4"/>
+              </a:cxn>
+              <a:cxn ang="0">
+                <a:pos x="connsiteX5" y="connsiteY5"/>
+              </a:cxn>
+              <a:cxn ang="0">
+                <a:pos x="connsiteX6" y="connsiteY6"/>
+              </a:cxn>
+            </a:cxnLst>
+            <a:rect l="l" t="t" r="r" b="b"/>
+            <a:pathLst>
+              <a:path w="1505749" h="1319583">
+                <a:moveTo>
+                  <a:pt x="104034" y="1275779"/>
+                </a:moveTo>
+                <a:lnTo>
+                  <a:pt x="104034" y="98558"/>
+                </a:lnTo>
+                <a:lnTo>
+                  <a:pt x="1505749" y="98558"/>
+                </a:lnTo>
+                <a:lnTo>
+                  <a:pt x="1500273" y="0"/>
+                </a:lnTo>
+                <a:lnTo>
+                  <a:pt x="0" y="0"/>
+                </a:lnTo>
+                <a:lnTo>
+                  <a:pt x="0" y="1319583"/>
+                </a:lnTo>
+                <a:lnTo>
+                  <a:pt x="104034" y="1275779"/>
+                </a:lnTo>
+                <a:close/>
+              </a:path>
+            </a:pathLst>
+          </a:custGeom>
+          <a:solidFill>
+            <a:srgbClr val="417AAC"/>
+          </a:solidFill>
+          <a:ln>
+            <a:solidFill>
+              <a:srgbClr val="417AAC"/>
+            </a:solidFill>
+          </a:ln>
+        </p:spPr>
+        <p:style>
+          <a:lnRef idx="2">
+            <a:schemeClr val="accent1">
+              <a:shade val="50000"/>
+            </a:schemeClr>
+          </a:lnRef>
+          <a:fillRef idx="1">
+            <a:schemeClr val="accent1"/>
+          </a:fillRef>
+          <a:effectRef idx="0">
+            <a:schemeClr val="accent1"/>
+          </a:effectRef>
+          <a:fontRef idx="minor">
+            <a:schemeClr val="lt1"/>
+          </a:fontRef>
+        </p:style>
+        <p:txBody>
+          <a:bodyPr rtlCol="0" anchor="ctr"/>
+          <a:lstStyle/>
+          <a:p>
+            <a:pPr algn="ctr"/>
+            <a:endParaRPr lang="en-US" dirty="0"/>
+          </a:p>
+        </p:txBody>
+      </p:sp>
+      <p:sp>
+        <p:nvSpPr>
+          <p:cNvPr id="22" name="Freeform 21">
+            <a:extLst>
+              <a:ext uri="{FF2B5EF4-FFF2-40B4-BE49-F238E27FC236}">
+                <a16:creationId xmlns:a16="http://schemas.microsoft.com/office/drawing/2014/main" id="{21AE7873-1989-9B76-E743-EEE1873F7BF6}"/>
+              </a:ext>
+            </a:extLst>
+          </p:cNvPr>
+          <p:cNvSpPr/>
+          <p:nvPr/>
+        </p:nvSpPr>
+        <p:spPr>
+          <a:xfrm>
+            <a:off x="5571270" y="3216829"/>
+            <a:ext cx="1505749" cy="1390764"/>
+          </a:xfrm>
+          <a:custGeom>
+            <a:avLst/>
+            <a:gdLst>
+              <a:gd name="connsiteX0" fmla="*/ 104034 w 1505749"/>
+              <a:gd name="connsiteY0" fmla="*/ 1275779 h 1319583"/>
+              <a:gd name="connsiteX1" fmla="*/ 104034 w 1505749"/>
+              <a:gd name="connsiteY1" fmla="*/ 98558 h 1319583"/>
+              <a:gd name="connsiteX2" fmla="*/ 1505749 w 1505749"/>
+              <a:gd name="connsiteY2" fmla="*/ 98558 h 1319583"/>
+              <a:gd name="connsiteX3" fmla="*/ 1500273 w 1505749"/>
+              <a:gd name="connsiteY3" fmla="*/ 0 h 1319583"/>
+              <a:gd name="connsiteX4" fmla="*/ 0 w 1505749"/>
+              <a:gd name="connsiteY4" fmla="*/ 0 h 1319583"/>
+              <a:gd name="connsiteX5" fmla="*/ 0 w 1505749"/>
+              <a:gd name="connsiteY5" fmla="*/ 1319583 h 1319583"/>
+              <a:gd name="connsiteX6" fmla="*/ 104034 w 1505749"/>
+              <a:gd name="connsiteY6" fmla="*/ 1275779 h 1319583"/>
+            </a:gdLst>
+            <a:ahLst/>
+            <a:cxnLst>
+              <a:cxn ang="0">
+                <a:pos x="connsiteX0" y="connsiteY0"/>
+              </a:cxn>
+              <a:cxn ang="0">
+                <a:pos x="connsiteX1" y="connsiteY1"/>
+              </a:cxn>
+              <a:cxn ang="0">
+                <a:pos x="connsiteX2" y="connsiteY2"/>
+              </a:cxn>
+              <a:cxn ang="0">
+                <a:pos x="connsiteX3" y="connsiteY3"/>
+              </a:cxn>
+              <a:cxn ang="0">
+                <a:pos x="connsiteX4" y="connsiteY4"/>
+              </a:cxn>
+              <a:cxn ang="0">
+                <a:pos x="connsiteX5" y="connsiteY5"/>
+              </a:cxn>
+              <a:cxn ang="0">
+                <a:pos x="connsiteX6" y="connsiteY6"/>
+              </a:cxn>
+            </a:cxnLst>
+            <a:rect l="l" t="t" r="r" b="b"/>
+            <a:pathLst>
+              <a:path w="1505749" h="1319583">
+                <a:moveTo>
+                  <a:pt x="104034" y="1275779"/>
+                </a:moveTo>
+                <a:lnTo>
+                  <a:pt x="104034" y="98558"/>
+                </a:lnTo>
+                <a:lnTo>
+                  <a:pt x="1505749" y="98558"/>
+                </a:lnTo>
+                <a:lnTo>
+                  <a:pt x="1500273" y="0"/>
+                </a:lnTo>
+                <a:lnTo>
+                  <a:pt x="0" y="0"/>
+                </a:lnTo>
+                <a:lnTo>
+                  <a:pt x="0" y="1319583"/>
+                </a:lnTo>
+                <a:lnTo>
+                  <a:pt x="104034" y="1275779"/>
+                </a:lnTo>
+                <a:close/>
+              </a:path>
+            </a:pathLst>
+          </a:custGeom>
+          <a:solidFill>
+            <a:srgbClr val="417AAC"/>
+          </a:solidFill>
+          <a:ln>
+            <a:solidFill>
+              <a:srgbClr val="417AAC"/>
+            </a:solidFill>
+          </a:ln>
+        </p:spPr>
+        <p:style>
+          <a:lnRef idx="2">
+            <a:schemeClr val="accent1">
+              <a:shade val="50000"/>
+            </a:schemeClr>
+          </a:lnRef>
+          <a:fillRef idx="1">
+            <a:schemeClr val="accent1"/>
+          </a:fillRef>
+          <a:effectRef idx="0">
+            <a:schemeClr val="accent1"/>
+          </a:effectRef>
+          <a:fontRef idx="minor">
+            <a:schemeClr val="lt1"/>
+          </a:fontRef>
+        </p:style>
+        <p:txBody>
+          <a:bodyPr rtlCol="0" anchor="ctr"/>
+          <a:lstStyle/>
+          <a:p>
+            <a:pPr algn="ctr"/>
+            <a:endParaRPr lang="en-US" dirty="0"/>
+          </a:p>
+        </p:txBody>
+      </p:sp>
+      <p:sp>
+        <p:nvSpPr>
+          <p:cNvPr id="23" name="Freeform 22">
+            <a:extLst>
+              <a:ext uri="{FF2B5EF4-FFF2-40B4-BE49-F238E27FC236}">
+                <a16:creationId xmlns:a16="http://schemas.microsoft.com/office/drawing/2014/main" id="{037DCFAA-7EA7-59D7-5DD3-BE1B27FCAF17}"/>
+              </a:ext>
+            </a:extLst>
+          </p:cNvPr>
+          <p:cNvSpPr/>
+          <p:nvPr/>
+        </p:nvSpPr>
+        <p:spPr>
+          <a:xfrm>
+            <a:off x="5641539" y="3287098"/>
+            <a:ext cx="1505749" cy="1390764"/>
+          </a:xfrm>
+          <a:custGeom>
+            <a:avLst/>
+            <a:gdLst>
+              <a:gd name="connsiteX0" fmla="*/ 104034 w 1505749"/>
+              <a:gd name="connsiteY0" fmla="*/ 1275779 h 1319583"/>
+              <a:gd name="connsiteX1" fmla="*/ 104034 w 1505749"/>
+              <a:gd name="connsiteY1" fmla="*/ 98558 h 1319583"/>
+              <a:gd name="connsiteX2" fmla="*/ 1505749 w 1505749"/>
+              <a:gd name="connsiteY2" fmla="*/ 98558 h 1319583"/>
+              <a:gd name="connsiteX3" fmla="*/ 1500273 w 1505749"/>
+              <a:gd name="connsiteY3" fmla="*/ 0 h 1319583"/>
+              <a:gd name="connsiteX4" fmla="*/ 0 w 1505749"/>
+              <a:gd name="connsiteY4" fmla="*/ 0 h 1319583"/>
+              <a:gd name="connsiteX5" fmla="*/ 0 w 1505749"/>
+              <a:gd name="connsiteY5" fmla="*/ 1319583 h 1319583"/>
+              <a:gd name="connsiteX6" fmla="*/ 104034 w 1505749"/>
+              <a:gd name="connsiteY6" fmla="*/ 1275779 h 1319583"/>
+            </a:gdLst>
+            <a:ahLst/>
+            <a:cxnLst>
+              <a:cxn ang="0">
+                <a:pos x="connsiteX0" y="connsiteY0"/>
+              </a:cxn>
+              <a:cxn ang="0">
+                <a:pos x="connsiteX1" y="connsiteY1"/>
+              </a:cxn>
+              <a:cxn ang="0">
+                <a:pos x="connsiteX2" y="connsiteY2"/>
+              </a:cxn>
+              <a:cxn ang="0">
+                <a:pos x="connsiteX3" y="connsiteY3"/>
+              </a:cxn>
+              <a:cxn ang="0">
+                <a:pos x="connsiteX4" y="connsiteY4"/>
+              </a:cxn>
+              <a:cxn ang="0">
+                <a:pos x="connsiteX5" y="connsiteY5"/>
+              </a:cxn>
+              <a:cxn ang="0">
+                <a:pos x="connsiteX6" y="connsiteY6"/>
+              </a:cxn>
+            </a:cxnLst>
+            <a:rect l="l" t="t" r="r" b="b"/>
+            <a:pathLst>
+              <a:path w="1505749" h="1319583">
+                <a:moveTo>
+                  <a:pt x="104034" y="1275779"/>
+                </a:moveTo>
+                <a:lnTo>
+                  <a:pt x="104034" y="98558"/>
+                </a:lnTo>
+                <a:lnTo>
+                  <a:pt x="1505749" y="98558"/>
+                </a:lnTo>
+                <a:lnTo>
+                  <a:pt x="1500273" y="0"/>
+                </a:lnTo>
+                <a:lnTo>
+                  <a:pt x="0" y="0"/>
+                </a:lnTo>
+                <a:lnTo>
+                  <a:pt x="0" y="1319583"/>
+                </a:lnTo>
+                <a:lnTo>
+                  <a:pt x="104034" y="1275779"/>
+                </a:lnTo>
+                <a:close/>
+              </a:path>
+            </a:pathLst>
+          </a:custGeom>
+          <a:solidFill>
+            <a:srgbClr val="417AAC"/>
+          </a:solidFill>
+          <a:ln>
+            <a:solidFill>
+              <a:srgbClr val="417AAC"/>
+            </a:solidFill>
+          </a:ln>
+        </p:spPr>
+        <p:style>
+          <a:lnRef idx="2">
+            <a:schemeClr val="accent1">
+              <a:shade val="50000"/>
+            </a:schemeClr>
+          </a:lnRef>
+          <a:fillRef idx="1">
+            <a:schemeClr val="accent1"/>
+          </a:fillRef>
+          <a:effectRef idx="0">
+            <a:schemeClr val="accent1"/>
+          </a:effectRef>
+          <a:fontRef idx="minor">
+            <a:schemeClr val="lt1"/>
+          </a:fontRef>
+        </p:style>
+        <p:txBody>
+          <a:bodyPr rtlCol="0" anchor="ctr"/>
+          <a:lstStyle/>
+          <a:p>
+            <a:pPr algn="ctr"/>
+            <a:endParaRPr lang="en-US" dirty="0"/>
+          </a:p>
+        </p:txBody>
+      </p:sp>
+      <p:sp>
+        <p:nvSpPr>
+          <p:cNvPr id="24" name="Rectangle 23">
+            <a:extLst>
+              <a:ext uri="{FF2B5EF4-FFF2-40B4-BE49-F238E27FC236}">
+                <a16:creationId xmlns:a16="http://schemas.microsoft.com/office/drawing/2014/main" id="{6313D384-DC1B-613B-86FE-20C2677CB4BD}"/>
+              </a:ext>
+            </a:extLst>
+          </p:cNvPr>
+          <p:cNvSpPr/>
+          <p:nvPr/>
+        </p:nvSpPr>
+        <p:spPr>
+          <a:xfrm>
+            <a:off x="5721844" y="3350975"/>
+            <a:ext cx="1511224" cy="1326887"/>
+          </a:xfrm>
+          <a:prstGeom prst="rect">
+            <a:avLst/>
+          </a:prstGeom>
+          <a:solidFill>
+            <a:srgbClr val="417AAC"/>
+          </a:solidFill>
+          <a:ln>
+            <a:solidFill>
+              <a:srgbClr val="417AAC"/>
+            </a:solidFill>
+          </a:ln>
+        </p:spPr>
+        <p:style>
+          <a:lnRef idx="2">
+            <a:schemeClr val="accent1">
+              <a:shade val="50000"/>
+            </a:schemeClr>
+          </a:lnRef>
+          <a:fillRef idx="1">
+            <a:schemeClr val="accent1"/>
+          </a:fillRef>
+          <a:effectRef idx="0">
+            <a:schemeClr val="accent1"/>
+          </a:effectRef>
+          <a:fontRef idx="minor">
+            <a:schemeClr val="lt1"/>
+          </a:fontRef>
+        </p:style>
+        <p:txBody>
+          <a:bodyPr rtlCol="0" anchor="ctr"/>
+          <a:lstStyle/>
+          <a:p>
+            <a:pPr algn="ctr"/>
+            <a:endParaRPr lang="en-US"/>
+          </a:p>
+        </p:txBody>
+      </p:sp>
     </p:spTree>
     <p:extLst>
       <p:ext uri="{BB962C8B-B14F-4D97-AF65-F5344CB8AC3E}">
-        <p14:creationId xmlns:p14="http://schemas.microsoft.com/office/powerpoint/2010/main" val="242917792"/>
+        <p14:creationId xmlns:p14="http://schemas.microsoft.com/office/powerpoint/2010/main" val="265104891"/>
       </p:ext>
     </p:extLst>
   </p:cSld>
@@ -10808,9 +10941,6 @@
                     <p:cTn id="3" fill="hold">
                       <p:stCondLst>
                         <p:cond delay="indefinite"/>
-                        <p:cond evt="onBegin" delay="0">
-                          <p:tn val="2"/>
-                        </p:cond>
                       </p:stCondLst>
                       <p:childTnLst>
                         <p:par>
@@ -10820,7 +10950,7 @@
                             </p:stCondLst>
                             <p:childTnLst>
                               <p:par>
-                                <p:cTn id="5" presetID="1" presetClass="exit" presetSubtype="0" fill="hold" grpId="0" nodeType="withEffect">
+                                <p:cTn id="5" presetID="1" presetClass="exit" presetSubtype="0" fill="hold" grpId="0" nodeType="clickEffect">
                                   <p:stCondLst>
                                     <p:cond delay="0"/>
                                   </p:stCondLst>
@@ -10833,7 +10963,7 @@
                                           </p:stCondLst>
                                         </p:cTn>
                                         <p:tgtEl>
-                                          <p:spTgt spid="12"/>
+                                          <p:spTgt spid="24"/>
                                         </p:tgtEl>
                                         <p:attrNameLst>
                                           <p:attrName>style.visibility</p:attrName>
@@ -10856,7 +10986,7 @@
                             </p:stCondLst>
                             <p:childTnLst>
                               <p:par>
-                                <p:cTn id="8" presetID="1" presetClass="exit" presetSubtype="0" fill="hold" nodeType="afterEffect">
+                                <p:cTn id="8" presetID="1" presetClass="exit" presetSubtype="0" fill="hold" grpId="0" nodeType="afterEffect">
                                   <p:stCondLst>
                                     <p:cond delay="1000"/>
                                   </p:stCondLst>
@@ -10869,7 +10999,7 @@
                                           </p:stCondLst>
                                         </p:cTn>
                                         <p:tgtEl>
-                                          <p:spTgt spid="13"/>
+                                          <p:spTgt spid="23"/>
                                         </p:tgtEl>
                                         <p:attrNameLst>
                                           <p:attrName>style.visibility</p:attrName>
@@ -10892,7 +11022,7 @@
                             </p:stCondLst>
                             <p:childTnLst>
                               <p:par>
-                                <p:cTn id="11" presetID="1" presetClass="exit" presetSubtype="0" fill="hold" nodeType="afterEffect">
+                                <p:cTn id="11" presetID="1" presetClass="exit" presetSubtype="0" fill="hold" grpId="0" nodeType="afterEffect">
                                   <p:stCondLst>
                                     <p:cond delay="1000"/>
                                   </p:stCondLst>
@@ -10905,7 +11035,7 @@
                                           </p:stCondLst>
                                         </p:cTn>
                                         <p:tgtEl>
-                                          <p:spTgt spid="9"/>
+                                          <p:spTgt spid="22"/>
                                         </p:tgtEl>
                                         <p:attrNameLst>
                                           <p:attrName>style.visibility</p:attrName>
@@ -10928,7 +11058,7 @@
                             </p:stCondLst>
                             <p:childTnLst>
                               <p:par>
-                                <p:cTn id="14" presetID="1" presetClass="exit" presetSubtype="0" fill="hold" nodeType="afterEffect">
+                                <p:cTn id="14" presetID="1" presetClass="exit" presetSubtype="0" fill="hold" grpId="0" nodeType="afterEffect">
                                   <p:stCondLst>
                                     <p:cond delay="1000"/>
                                   </p:stCondLst>
@@ -10941,7 +11071,79 @@
                                           </p:stCondLst>
                                         </p:cTn>
                                         <p:tgtEl>
-                                          <p:spTgt spid="6"/>
+                                          <p:spTgt spid="21"/>
+                                        </p:tgtEl>
+                                        <p:attrNameLst>
+                                          <p:attrName>style.visibility</p:attrName>
+                                        </p:attrNameLst>
+                                      </p:cBhvr>
+                                      <p:to>
+                                        <p:strVal val="hidden"/>
+                                      </p:to>
+                                    </p:set>
+                                  </p:childTnLst>
+                                </p:cTn>
+                              </p:par>
+                            </p:childTnLst>
+                          </p:cTn>
+                        </p:par>
+                        <p:par>
+                          <p:cTn id="16" fill="hold">
+                            <p:stCondLst>
+                              <p:cond delay="3000"/>
+                            </p:stCondLst>
+                            <p:childTnLst>
+                              <p:par>
+                                <p:cTn id="17" presetID="1" presetClass="exit" presetSubtype="0" fill="hold" grpId="0" nodeType="afterEffect">
+                                  <p:stCondLst>
+                                    <p:cond delay="1000"/>
+                                  </p:stCondLst>
+                                  <p:childTnLst>
+                                    <p:set>
+                                      <p:cBhvr>
+                                        <p:cTn id="18" dur="1" fill="hold">
+                                          <p:stCondLst>
+                                            <p:cond delay="0"/>
+                                          </p:stCondLst>
+                                        </p:cTn>
+                                        <p:tgtEl>
+                                          <p:spTgt spid="20"/>
+                                        </p:tgtEl>
+                                        <p:attrNameLst>
+                                          <p:attrName>style.visibility</p:attrName>
+                                        </p:attrNameLst>
+                                      </p:cBhvr>
+                                      <p:to>
+                                        <p:strVal val="hidden"/>
+                                      </p:to>
+                                    </p:set>
+                                  </p:childTnLst>
+                                </p:cTn>
+                              </p:par>
+                            </p:childTnLst>
+                          </p:cTn>
+                        </p:par>
+                        <p:par>
+                          <p:cTn id="19" fill="hold">
+                            <p:stCondLst>
+                              <p:cond delay="4000"/>
+                            </p:stCondLst>
+                            <p:childTnLst>
+                              <p:par>
+                                <p:cTn id="20" presetID="1" presetClass="exit" presetSubtype="0" fill="hold" grpId="0" nodeType="afterEffect">
+                                  <p:stCondLst>
+                                    <p:cond delay="1000"/>
+                                  </p:stCondLst>
+                                  <p:childTnLst>
+                                    <p:set>
+                                      <p:cBhvr>
+                                        <p:cTn id="21" dur="1" fill="hold">
+                                          <p:stCondLst>
+                                            <p:cond delay="0"/>
+                                          </p:stCondLst>
+                                        </p:cTn>
+                                        <p:tgtEl>
+                                          <p:spTgt spid="19"/>
                                         </p:tgtEl>
                                         <p:attrNameLst>
                                           <p:attrName>style.visibility</p:attrName>
@@ -10982,7 +11184,12 @@
       </p:par>
     </p:tnLst>
     <p:bldLst>
-      <p:bldP spid="12" grpId="0" animBg="1"/>
+      <p:bldP spid="19" grpId="0" animBg="1"/>
+      <p:bldP spid="20" grpId="0" animBg="1"/>
+      <p:bldP spid="21" grpId="0" animBg="1"/>
+      <p:bldP spid="22" grpId="0" animBg="1"/>
+      <p:bldP spid="23" grpId="0" animBg="1"/>
+      <p:bldP spid="24" grpId="0" animBg="1"/>
     </p:bldLst>
   </p:timing>
 </p:sld>

</xml_diff>

<commit_message>
Edits in response to M. Gitzendanner feedback (09.09.22).
</commit_message>
<xml_diff>
--- a/presentations/01_cnn_intro.pptx
+++ b/presentations/01_cnn_intro.pptx
@@ -20,13 +20,13 @@
     <p:sldId id="257" r:id="rId11"/>
     <p:sldId id="297" r:id="rId12"/>
     <p:sldId id="298" r:id="rId13"/>
-    <p:sldId id="323" r:id="rId14"/>
+    <p:sldId id="324" r:id="rId14"/>
     <p:sldId id="332" r:id="rId15"/>
     <p:sldId id="333" r:id="rId16"/>
     <p:sldId id="354" r:id="rId17"/>
     <p:sldId id="325" r:id="rId18"/>
     <p:sldId id="326" r:id="rId19"/>
-    <p:sldId id="324" r:id="rId20"/>
+    <p:sldId id="323" r:id="rId20"/>
     <p:sldId id="353" r:id="rId21"/>
   </p:sldIdLst>
   <p:sldSz cx="12192000" cy="6858000"/>
@@ -227,7 +227,7 @@
           <a:p>
             <a:fld id="{FD93C9B2-20F6-4DB1-B471-224337D0AC79}" type="datetimeFigureOut">
               <a:rPr lang="en-US" smtClean="0"/>
-              <a:t>9/8/2022</a:t>
+              <a:t>9/9/2022</a:t>
             </a:fld>
             <a:endParaRPr lang="en-US"/>
           </a:p>
@@ -1137,7 +1137,7 @@
                 <a:latin typeface="Calibri" panose="020F0502020204030204" pitchFamily="34" charset="0"/>
                 <a:cs typeface="Calibri" panose="020F0502020204030204" pitchFamily="34" charset="0"/>
               </a:rPr>
-              <a:t>Humans can see through their eyes by transforming light into electrical signals that are then processed by the brain. But computers do not have physical eyes to capture light. They can only process information in digital forms composed of bits (0 or 1). So, to be able to “see", computers require a digitized version of an image.</a:t>
+              <a:t>Eyes transform light into electrical signals that are then processed by the brain. But computers do not have physical eyes to capture light. They can only process information in digital forms composed of bits (0 or 1). So, to be able to “see", computers require a digitized version of an image.</a:t>
             </a:r>
           </a:p>
           <a:p>
@@ -1432,7 +1432,22 @@
           <a:bodyPr/>
           <a:lstStyle/>
           <a:p>
-            <a:pPr marL="0" marR="0" lvl="0" indent="0" algn="l" defTabSz="914400" rtl="0" eaLnBrk="1" fontAlgn="auto" latinLnBrk="0" hangingPunct="1">
+            <a:pPr defTabSz="939363">
+              <a:defRPr/>
+            </a:pPr>
+            <a:r>
+              <a:rPr lang="en-US" dirty="0"/>
+              <a:t>The MNIST (Modified National Institute of Standards &amp; Technology) dataset is famous in AI.  It was curated by Yann LeCun, Corinna Cortes, and Chris Burges in 1998.  It consists of 60,000 handwritten digits for model training and 10,000 more for validating the model’s performance on unseen data.  Each MNIST digit is a 28 x 28-pixel image.  Each pixel is 8-bit, meaning that the pixel darkness can vary from 0 (white) to 255 (black), with the intervening range of integers representing gradually darker shades of gray. </a:t>
+            </a:r>
+          </a:p>
+          <a:p>
+            <a:pPr defTabSz="939363">
+              <a:defRPr/>
+            </a:pPr>
+            <a:endParaRPr lang="en-US" dirty="0"/>
+          </a:p>
+          <a:p>
+            <a:pPr marL="0" marR="0" lvl="0" indent="0" algn="l" defTabSz="939363" rtl="0" eaLnBrk="1" fontAlgn="auto" latinLnBrk="0" hangingPunct="1">
               <a:lnSpc>
                 <a:spcPct val="100000"/>
               </a:lnSpc>
@@ -1452,239 +1467,73 @@
             <a:r>
               <a:rPr lang="en-US" sz="1200" dirty="0">
                 <a:solidFill>
-                  <a:schemeClr val="tx1">
-                    <a:lumMod val="65000"/>
-                    <a:lumOff val="35000"/>
-                  </a:schemeClr>
-                </a:solidFill>
-                <a:latin typeface="+mj-lt"/>
-                <a:ea typeface="Verdana" panose="020B0604030504040204" pitchFamily="34" charset="0"/>
-              </a:rPr>
-              <a:t>Source: Google Teachable Machine: </a:t>
+                  <a:srgbClr val="000000"/>
+                </a:solidFill>
+                <a:latin typeface="+mn-lt"/>
+              </a:rPr>
+              <a:t>In 1998, Yann LeCun and co-authors introduced the famous </a:t>
+            </a:r>
+            <a:r>
+              <a:rPr lang="en-US" sz="1200" i="1" dirty="0">
+                <a:solidFill>
+                  <a:srgbClr val="000000"/>
+                </a:solidFill>
+                <a:latin typeface="+mn-lt"/>
+              </a:rPr>
+              <a:t>LeNet-5 </a:t>
             </a:r>
             <a:r>
               <a:rPr lang="en-US" sz="1200" dirty="0">
                 <a:solidFill>
-                  <a:schemeClr val="tx1">
-                    <a:lumMod val="65000"/>
-                    <a:lumOff val="35000"/>
-                  </a:schemeClr>
-                </a:solidFill>
-                <a:latin typeface="+mj-lt"/>
-                <a:ea typeface="Verdana" panose="020B0604030504040204" pitchFamily="34" charset="0"/>
-                <a:hlinkClick r:id="rId3"/>
-              </a:rPr>
-              <a:t>https://teachablemachine.withgoogle.com</a:t>
-            </a:r>
-            <a:r>
-              <a:rPr lang="en-US" sz="1200" dirty="0">
-                <a:solidFill>
-                  <a:schemeClr val="tx1">
-                    <a:lumMod val="65000"/>
-                    <a:lumOff val="35000"/>
-                  </a:schemeClr>
-                </a:solidFill>
-                <a:latin typeface="+mj-lt"/>
-                <a:ea typeface="Verdana" panose="020B0604030504040204" pitchFamily="34" charset="0"/>
-              </a:rPr>
-              <a:t> </a:t>
-            </a:r>
-          </a:p>
-          <a:p>
-            <a:pPr marL="0" marR="0" lvl="0" indent="0" algn="l" defTabSz="914400" rtl="0" eaLnBrk="1" fontAlgn="auto" latinLnBrk="0" hangingPunct="1">
-              <a:lnSpc>
-                <a:spcPct val="100000"/>
-              </a:lnSpc>
-              <a:spcBef>
-                <a:spcPts val="0"/>
-              </a:spcBef>
-              <a:spcAft>
-                <a:spcPts val="0"/>
-              </a:spcAft>
-              <a:buClrTx/>
-              <a:buSzTx/>
-              <a:buFontTx/>
-              <a:buNone/>
-              <a:tabLst/>
+                  <a:srgbClr val="000000"/>
+                </a:solidFill>
+                <a:latin typeface="+mn-lt"/>
+              </a:rPr>
+              <a:t>architecture.  This model was widely used by banks to recognize handwritten check numbers.  In today’s MNIST exercise, you will create a shallow Keras network that does the same thing.   </a:t>
+            </a:r>
+          </a:p>
+          <a:p>
+            <a:pPr defTabSz="939363">
               <a:defRPr/>
             </a:pPr>
-            <a:endParaRPr lang="en-US" sz="1200" dirty="0">
-              <a:solidFill>
-                <a:schemeClr val="tx1">
-                  <a:lumMod val="65000"/>
-                  <a:lumOff val="35000"/>
-                </a:schemeClr>
-              </a:solidFill>
-              <a:latin typeface="Palatino Linotype" panose="02040502050505030304" pitchFamily="18" charset="0"/>
-            </a:endParaRPr>
-          </a:p>
-          <a:p>
-            <a:pPr marL="0" marR="0" lvl="0" indent="0" algn="l" defTabSz="914400" rtl="0" eaLnBrk="1" fontAlgn="auto" latinLnBrk="0" hangingPunct="1">
-              <a:lnSpc>
-                <a:spcPct val="100000"/>
-              </a:lnSpc>
-              <a:spcBef>
-                <a:spcPts val="0"/>
-              </a:spcBef>
-              <a:spcAft>
-                <a:spcPts val="0"/>
-              </a:spcAft>
-              <a:buClrTx/>
-              <a:buSzTx/>
-              <a:buFontTx/>
-              <a:buNone/>
-              <a:tabLst/>
+            <a:endParaRPr lang="en-US" dirty="0"/>
+          </a:p>
+          <a:p>
+            <a:pPr defTabSz="939363">
               <a:defRPr/>
             </a:pPr>
             <a:r>
-              <a:rPr lang="en-US" sz="1200" dirty="0">
-                <a:solidFill>
-                  <a:schemeClr val="tx1">
-                    <a:lumMod val="65000"/>
-                    <a:lumOff val="35000"/>
-                  </a:schemeClr>
-                </a:solidFill>
-                <a:latin typeface="Palatino Linotype" panose="02040502050505030304" pitchFamily="18" charset="0"/>
-              </a:rPr>
-              <a:t>Two Locations for the Hanfu/Hanbok dataset</a:t>
-            </a:r>
-          </a:p>
-          <a:p>
-            <a:pPr marL="0" marR="0" lvl="0" indent="0" algn="l" defTabSz="914400" rtl="0" eaLnBrk="1" fontAlgn="auto" latinLnBrk="0" hangingPunct="1">
-              <a:lnSpc>
-                <a:spcPct val="100000"/>
-              </a:lnSpc>
-              <a:spcBef>
-                <a:spcPts val="0"/>
-              </a:spcBef>
-              <a:spcAft>
-                <a:spcPts val="0"/>
-              </a:spcAft>
-              <a:buClrTx/>
-              <a:buSzTx/>
-              <a:buFontTx/>
-              <a:buNone/>
-              <a:tabLst/>
+              <a:rPr lang="en-US" dirty="0"/>
+              <a:t>The exercise for this workshop starts on page 123 of </a:t>
+            </a:r>
+            <a:r>
+              <a:rPr lang="en-US" i="1" dirty="0"/>
+              <a:t>The</a:t>
+            </a:r>
+            <a:r>
+              <a:rPr lang="en-US" dirty="0"/>
+              <a:t> </a:t>
+            </a:r>
+            <a:r>
+              <a:rPr lang="en-US" i="1" dirty="0"/>
+              <a:t>Deep Learning Workshop</a:t>
+            </a:r>
+            <a:r>
+              <a:rPr lang="en-US" dirty="0"/>
+              <a:t>. </a:t>
+            </a:r>
+          </a:p>
+          <a:p>
+            <a:pPr defTabSz="939363">
               <a:defRPr/>
             </a:pPr>
-            <a:r>
-              <a:rPr lang="en-US" b="0" i="0" dirty="0">
-                <a:effectLst/>
-                <a:latin typeface="Lato" panose="020F0502020204030203" pitchFamily="34" charset="0"/>
-              </a:rPr>
-              <a:t>	https://drive.google.com/file/d/1q3RIgIoeePNW-fEgNyCgh45gBvMAdeOU/view</a:t>
-            </a:r>
-          </a:p>
-          <a:p>
-            <a:pPr marL="0" marR="0" lvl="0" indent="0" algn="l" defTabSz="914400" rtl="0" eaLnBrk="1" fontAlgn="auto" latinLnBrk="0" hangingPunct="1">
-              <a:lnSpc>
-                <a:spcPct val="100000"/>
-              </a:lnSpc>
-              <a:spcBef>
-                <a:spcPts val="0"/>
-              </a:spcBef>
-              <a:spcAft>
-                <a:spcPts val="0"/>
-              </a:spcAft>
-              <a:buClrTx/>
-              <a:buSzTx/>
-              <a:buFontTx/>
-              <a:buNone/>
-              <a:tabLst/>
+            <a:endParaRPr lang="en-US" dirty="0"/>
+          </a:p>
+          <a:p>
+            <a:pPr defTabSz="939363">
               <a:defRPr/>
             </a:pPr>
-            <a:r>
-              <a:rPr lang="en-US" b="0" i="0" dirty="0">
-                <a:effectLst/>
-                <a:latin typeface="Lato" panose="020F0502020204030203" pitchFamily="34" charset="0"/>
-              </a:rPr>
-              <a:t>	https://drive.google.com/file/d/1WbZPzunh6u9f0leymbzmVrJjSxq6JW5w/view?usp=sharing</a:t>
-            </a:r>
-          </a:p>
-          <a:p>
-            <a:pPr marL="0" marR="0" lvl="0" indent="0" algn="l" defTabSz="914400" rtl="0" eaLnBrk="1" fontAlgn="auto" latinLnBrk="0" hangingPunct="1">
-              <a:lnSpc>
-                <a:spcPct val="100000"/>
-              </a:lnSpc>
-              <a:spcBef>
-                <a:spcPts val="0"/>
-              </a:spcBef>
-              <a:spcAft>
-                <a:spcPts val="0"/>
-              </a:spcAft>
-              <a:buClrTx/>
-              <a:buSzTx/>
-              <a:buFontTx/>
-              <a:buNone/>
-              <a:tabLst/>
-              <a:defRPr/>
-            </a:pPr>
-            <a:endParaRPr lang="en-US" sz="1200" dirty="0">
-              <a:solidFill>
-                <a:schemeClr val="tx1">
-                  <a:lumMod val="65000"/>
-                  <a:lumOff val="35000"/>
-                </a:schemeClr>
-              </a:solidFill>
-              <a:latin typeface="+mj-lt"/>
-              <a:ea typeface="Verdana" panose="020B0604030504040204" pitchFamily="34" charset="0"/>
-            </a:endParaRPr>
-          </a:p>
-          <a:p>
-            <a:pPr marL="0" marR="0" lvl="0" indent="0" algn="l" defTabSz="914400" rtl="0" eaLnBrk="1" fontAlgn="auto" latinLnBrk="0" hangingPunct="1">
-              <a:lnSpc>
-                <a:spcPct val="100000"/>
-              </a:lnSpc>
-              <a:spcBef>
-                <a:spcPts val="0"/>
-              </a:spcBef>
-              <a:spcAft>
-                <a:spcPts val="0"/>
-              </a:spcAft>
-              <a:buClrTx/>
-              <a:buSzTx/>
-              <a:buFontTx/>
-              <a:buNone/>
-              <a:tabLst/>
-              <a:defRPr/>
-            </a:pPr>
-            <a:endParaRPr lang="en-US" sz="1200" dirty="0">
-              <a:solidFill>
-                <a:schemeClr val="tx1">
-                  <a:lumMod val="65000"/>
-                  <a:lumOff val="35000"/>
-                </a:schemeClr>
-              </a:solidFill>
-              <a:latin typeface="Palatino Linotype" panose="02040502050505030304" pitchFamily="18" charset="0"/>
-            </a:endParaRPr>
-          </a:p>
-          <a:p>
-            <a:pPr marL="0" marR="0" lvl="0" indent="0" algn="l" defTabSz="914400" rtl="0" eaLnBrk="1" fontAlgn="auto" latinLnBrk="0" hangingPunct="1">
-              <a:lnSpc>
-                <a:spcPct val="100000"/>
-              </a:lnSpc>
-              <a:spcBef>
-                <a:spcPts val="0"/>
-              </a:spcBef>
-              <a:spcAft>
-                <a:spcPts val="0"/>
-              </a:spcAft>
-              <a:buClrTx/>
-              <a:buSzTx/>
-              <a:buFontTx/>
-              <a:buNone/>
-              <a:tabLst/>
-              <a:defRPr/>
-            </a:pPr>
-            <a:endParaRPr lang="en-US" sz="1200" dirty="0">
-              <a:solidFill>
-                <a:schemeClr val="tx1">
-                  <a:lumMod val="65000"/>
-                  <a:lumOff val="35000"/>
-                </a:schemeClr>
-              </a:solidFill>
-              <a:latin typeface="Palatino Linotype" panose="02040502050505030304" pitchFamily="18" charset="0"/>
-            </a:endParaRPr>
+            <a:endParaRPr lang="en-US" dirty="0"/>
           </a:p>
         </p:txBody>
       </p:sp>
@@ -1714,7 +1563,7 @@
     </p:spTree>
     <p:extLst>
       <p:ext uri="{BB962C8B-B14F-4D97-AF65-F5344CB8AC3E}">
-        <p14:creationId xmlns:p14="http://schemas.microsoft.com/office/powerpoint/2010/main" val="1404376956"/>
+        <p14:creationId xmlns:p14="http://schemas.microsoft.com/office/powerpoint/2010/main" val="1984289498"/>
       </p:ext>
     </p:extLst>
   </p:cSld>
@@ -1772,7 +1621,7 @@
               <a:rPr lang="en-US" dirty="0">
                 <a:latin typeface="+mn-lt"/>
               </a:rPr>
-              <a:t>So, how does a CNN like the Teachable Machine classify images?  Keep in mind that computers only understand numbers.  At the end of the vision notebook, we saw how a function could detect the presence or absence of a stripe, just by multiplying two matrices.</a:t>
+              <a:t>As mentioned earlier, computers only understand numbers.   In AI, we use special words to describe the different ways numbers are combined.  These combinations assume shapes and those shapes have names.  Thus, we need to introduce some numeric vocabulary.  AI vocabulary is important and worth learning.</a:t>
             </a:r>
           </a:p>
           <a:p>
@@ -1781,36 +1630,37 @@
             </a:endParaRPr>
           </a:p>
           <a:p>
+            <a:pPr marL="228600" indent="-228600">
+              <a:buAutoNum type="arabicPeriod"/>
+            </a:pPr>
             <a:r>
               <a:rPr lang="en-US" dirty="0">
                 <a:latin typeface="+mn-lt"/>
               </a:rPr>
-              <a:t>In AI, we use special words to describe the different ways numbers are combined.  These combinations assume shapes and those shapes have names.  Thus, we need to introduce some data vocabulary.  Note: data vocabulary is foundational and used extensively in machine learning and deep learning.</a:t>
-            </a:r>
-          </a:p>
-          <a:p>
-            <a:endParaRPr lang="en-US" dirty="0">
-              <a:latin typeface="+mn-lt"/>
-            </a:endParaRPr>
-          </a:p>
-          <a:p>
+              <a:t>A single number is </a:t>
+            </a:r>
+            <a:r>
+              <a:rPr lang="en-US" b="1" dirty="0">
+                <a:latin typeface="+mn-lt"/>
+              </a:rPr>
+              <a:t>atomic</a:t>
+            </a:r>
             <a:r>
               <a:rPr lang="en-US" dirty="0">
                 <a:latin typeface="+mn-lt"/>
               </a:rPr>
-              <a:t>A single number is </a:t>
-            </a:r>
-            <a:r>
-              <a:rPr lang="en-US" b="1" dirty="0">
-                <a:latin typeface="+mn-lt"/>
-              </a:rPr>
-              <a:t>atomic</a:t>
-            </a:r>
+              <a:t>.  </a:t>
+            </a:r>
+          </a:p>
+          <a:p>
+            <a:pPr marL="228600" indent="-228600">
+              <a:buAutoNum type="arabicPeriod"/>
+            </a:pPr>
             <a:r>
               <a:rPr lang="en-US" dirty="0">
                 <a:latin typeface="+mn-lt"/>
               </a:rPr>
-              <a:t>.  A series of numbers in a single row is a </a:t>
+              <a:t>A series of numbers in a single row is a </a:t>
             </a:r>
             <a:r>
               <a:rPr lang="en-US" b="1" dirty="0">
@@ -1939,7 +1789,7 @@
                 <a:ea typeface="Malgun Gothic" panose="020B0503020000020004" pitchFamily="34" charset="-127"/>
                 <a:cs typeface="Times New Roman" panose="02020603050405020304" pitchFamily="18" charset="0"/>
               </a:rPr>
-              <a:t>A 2-dimensional block of numbers comprised of…</a:t>
+              <a:t>A matrix is a 2-dimensional block of numbers comprised of…</a:t>
             </a:r>
           </a:p>
           <a:p>
@@ -2020,25 +1870,7 @@
                 <a:ea typeface="Malgun Gothic" panose="020B0503020000020004" pitchFamily="34" charset="-127"/>
                 <a:cs typeface="Times New Roman" panose="02020603050405020304" pitchFamily="18" charset="0"/>
               </a:rPr>
-              <a:t>And blocks is a </a:t>
-            </a:r>
-            <a:r>
-              <a:rPr lang="en-US" sz="1800" b="1" dirty="0">
-                <a:effectLst/>
-                <a:latin typeface="Palatino Linotype" panose="02040502050505030304" pitchFamily="18" charset="0"/>
-                <a:ea typeface="Malgun Gothic" panose="020B0503020000020004" pitchFamily="34" charset="-127"/>
-                <a:cs typeface="Times New Roman" panose="02020603050405020304" pitchFamily="18" charset="0"/>
-              </a:rPr>
-              <a:t>matrix</a:t>
-            </a:r>
-            <a:r>
-              <a:rPr lang="en-US" sz="1800" dirty="0">
-                <a:effectLst/>
-                <a:latin typeface="Palatino Linotype" panose="02040502050505030304" pitchFamily="18" charset="0"/>
-                <a:ea typeface="Malgun Gothic" panose="020B0503020000020004" pitchFamily="34" charset="-127"/>
-                <a:cs typeface="Times New Roman" panose="02020603050405020304" pitchFamily="18" charset="0"/>
-              </a:rPr>
-              <a:t>.</a:t>
+              <a:t>Columns</a:t>
             </a:r>
           </a:p>
           <a:p>
@@ -2832,56 +2664,259 @@
           <a:bodyPr/>
           <a:lstStyle/>
           <a:p>
-            <a:pPr defTabSz="939363">
+            <a:pPr marL="0" marR="0" lvl="0" indent="0" algn="l" defTabSz="914400" rtl="0" eaLnBrk="1" fontAlgn="auto" latinLnBrk="0" hangingPunct="1">
+              <a:lnSpc>
+                <a:spcPct val="100000"/>
+              </a:lnSpc>
+              <a:spcBef>
+                <a:spcPts val="0"/>
+              </a:spcBef>
+              <a:spcAft>
+                <a:spcPts val="0"/>
+              </a:spcAft>
+              <a:buClrTx/>
+              <a:buSzTx/>
+              <a:buFontTx/>
+              <a:buNone/>
+              <a:tabLst/>
               <a:defRPr/>
             </a:pPr>
             <a:r>
-              <a:rPr lang="en-US" dirty="0"/>
-              <a:t>The MNIST (Modified National Institute of Standards &amp; Technology) dataset is famous in AI.  It was curated by Yann LeCun, Corinna Cortes, and Chris Burges in 1998.  It consists of 60,000 handwritten digits for model training and 10,000 more for validating the model’s performance on unseen data.  Each MNIST digit is a 28 x 28-pixel image.  Each pixel is 8-bit, meaning that the pixel darkness can vary from 0 (white) to 255 (black), with the intervening range of integers representing gradually darker shades of gray. </a:t>
-            </a:r>
-          </a:p>
-          <a:p>
-            <a:pPr defTabSz="939363">
+              <a:rPr lang="en-US" sz="1200" dirty="0">
+                <a:solidFill>
+                  <a:schemeClr val="tx1">
+                    <a:lumMod val="65000"/>
+                    <a:lumOff val="35000"/>
+                  </a:schemeClr>
+                </a:solidFill>
+                <a:latin typeface="+mj-lt"/>
+                <a:ea typeface="Verdana" panose="020B0604030504040204" pitchFamily="34" charset="0"/>
+              </a:rPr>
+              <a:t>Source: Google Teachable Machine: </a:t>
+            </a:r>
+            <a:r>
+              <a:rPr lang="en-US" sz="1200" dirty="0">
+                <a:solidFill>
+                  <a:schemeClr val="tx1">
+                    <a:lumMod val="65000"/>
+                    <a:lumOff val="35000"/>
+                  </a:schemeClr>
+                </a:solidFill>
+                <a:latin typeface="+mj-lt"/>
+                <a:ea typeface="Verdana" panose="020B0604030504040204" pitchFamily="34" charset="0"/>
+                <a:hlinkClick r:id="rId3"/>
+              </a:rPr>
+              <a:t>https://teachablemachine.withgoogle.com</a:t>
+            </a:r>
+            <a:r>
+              <a:rPr lang="en-US" sz="1200" dirty="0">
+                <a:solidFill>
+                  <a:schemeClr val="tx1">
+                    <a:lumMod val="65000"/>
+                    <a:lumOff val="35000"/>
+                  </a:schemeClr>
+                </a:solidFill>
+                <a:latin typeface="+mj-lt"/>
+                <a:ea typeface="Verdana" panose="020B0604030504040204" pitchFamily="34" charset="0"/>
+              </a:rPr>
+              <a:t> </a:t>
+            </a:r>
+          </a:p>
+          <a:p>
+            <a:pPr marL="0" marR="0" lvl="0" indent="0" algn="l" defTabSz="914400" rtl="0" eaLnBrk="1" fontAlgn="auto" latinLnBrk="0" hangingPunct="1">
+              <a:lnSpc>
+                <a:spcPct val="100000"/>
+              </a:lnSpc>
+              <a:spcBef>
+                <a:spcPts val="0"/>
+              </a:spcBef>
+              <a:spcAft>
+                <a:spcPts val="0"/>
+              </a:spcAft>
+              <a:buClrTx/>
+              <a:buSzTx/>
+              <a:buFontTx/>
+              <a:buNone/>
+              <a:tabLst/>
               <a:defRPr/>
             </a:pPr>
-            <a:endParaRPr lang="en-US" dirty="0"/>
-          </a:p>
-          <a:p>
-            <a:pPr defTabSz="939363">
+            <a:endParaRPr lang="en-US" sz="1200" dirty="0">
+              <a:solidFill>
+                <a:schemeClr val="tx1">
+                  <a:lumMod val="65000"/>
+                  <a:lumOff val="35000"/>
+                </a:schemeClr>
+              </a:solidFill>
+              <a:latin typeface="Palatino Linotype" panose="02040502050505030304" pitchFamily="18" charset="0"/>
+            </a:endParaRPr>
+          </a:p>
+          <a:p>
+            <a:pPr marL="0" marR="0" lvl="0" indent="0" algn="l" defTabSz="914400" rtl="0" eaLnBrk="1" fontAlgn="auto" latinLnBrk="0" hangingPunct="1">
+              <a:lnSpc>
+                <a:spcPct val="100000"/>
+              </a:lnSpc>
+              <a:spcBef>
+                <a:spcPts val="0"/>
+              </a:spcBef>
+              <a:spcAft>
+                <a:spcPts val="0"/>
+              </a:spcAft>
+              <a:buClrTx/>
+              <a:buSzTx/>
+              <a:buFontTx/>
+              <a:buNone/>
+              <a:tabLst/>
               <a:defRPr/>
             </a:pPr>
             <a:r>
-              <a:rPr lang="en-US" dirty="0"/>
-              <a:t>The exercise for this workshop starts on page 123 of </a:t>
-            </a:r>
-            <a:r>
-              <a:rPr lang="en-US" i="1" dirty="0"/>
-              <a:t>The</a:t>
-            </a:r>
-            <a:r>
-              <a:rPr lang="en-US" dirty="0"/>
-              <a:t> </a:t>
-            </a:r>
-            <a:r>
-              <a:rPr lang="en-US" i="1" dirty="0"/>
-              <a:t>Deep Learning Workshop</a:t>
-            </a:r>
-            <a:r>
-              <a:rPr lang="en-US" dirty="0"/>
-              <a:t>. </a:t>
-            </a:r>
-          </a:p>
-          <a:p>
-            <a:pPr defTabSz="939363">
+              <a:rPr lang="en-US" sz="1200" dirty="0">
+                <a:solidFill>
+                  <a:schemeClr val="tx1">
+                    <a:lumMod val="65000"/>
+                    <a:lumOff val="35000"/>
+                  </a:schemeClr>
+                </a:solidFill>
+                <a:latin typeface="Palatino Linotype" panose="02040502050505030304" pitchFamily="18" charset="0"/>
+              </a:rPr>
+              <a:t>Two Locations for the Hanfu/Hanbok dataset</a:t>
+            </a:r>
+          </a:p>
+          <a:p>
+            <a:pPr marL="0" marR="0" lvl="0" indent="0" algn="l" defTabSz="914400" rtl="0" eaLnBrk="1" fontAlgn="auto" latinLnBrk="0" hangingPunct="1">
+              <a:lnSpc>
+                <a:spcPct val="100000"/>
+              </a:lnSpc>
+              <a:spcBef>
+                <a:spcPts val="0"/>
+              </a:spcBef>
+              <a:spcAft>
+                <a:spcPts val="0"/>
+              </a:spcAft>
+              <a:buClrTx/>
+              <a:buSzTx/>
+              <a:buFontTx/>
+              <a:buNone/>
+              <a:tabLst/>
               <a:defRPr/>
             </a:pPr>
-            <a:endParaRPr lang="en-US" dirty="0"/>
-          </a:p>
-          <a:p>
-            <a:pPr defTabSz="939363">
+            <a:r>
+              <a:rPr lang="en-US" b="0" i="0" dirty="0">
+                <a:effectLst/>
+                <a:latin typeface="Lato" panose="020F0502020204030203" pitchFamily="34" charset="0"/>
+              </a:rPr>
+              <a:t>	https://drive.google.com/file/d/1q3RIgIoeePNW-fEgNyCgh45gBvMAdeOU/view</a:t>
+            </a:r>
+          </a:p>
+          <a:p>
+            <a:pPr marL="0" marR="0" lvl="0" indent="0" algn="l" defTabSz="914400" rtl="0" eaLnBrk="1" fontAlgn="auto" latinLnBrk="0" hangingPunct="1">
+              <a:lnSpc>
+                <a:spcPct val="100000"/>
+              </a:lnSpc>
+              <a:spcBef>
+                <a:spcPts val="0"/>
+              </a:spcBef>
+              <a:spcAft>
+                <a:spcPts val="0"/>
+              </a:spcAft>
+              <a:buClrTx/>
+              <a:buSzTx/>
+              <a:buFontTx/>
+              <a:buNone/>
+              <a:tabLst/>
               <a:defRPr/>
             </a:pPr>
-            <a:endParaRPr lang="en-US" dirty="0"/>
+            <a:r>
+              <a:rPr lang="en-US" b="0" i="0" dirty="0">
+                <a:effectLst/>
+                <a:latin typeface="Lato" panose="020F0502020204030203" pitchFamily="34" charset="0"/>
+              </a:rPr>
+              <a:t>	https://drive.google.com/file/d/1WbZPzunh6u9f0leymbzmVrJjSxq6JW5w/view?usp=sharing</a:t>
+            </a:r>
+          </a:p>
+          <a:p>
+            <a:pPr marL="0" marR="0" lvl="0" indent="0" algn="l" defTabSz="914400" rtl="0" eaLnBrk="1" fontAlgn="auto" latinLnBrk="0" hangingPunct="1">
+              <a:lnSpc>
+                <a:spcPct val="100000"/>
+              </a:lnSpc>
+              <a:spcBef>
+                <a:spcPts val="0"/>
+              </a:spcBef>
+              <a:spcAft>
+                <a:spcPts val="0"/>
+              </a:spcAft>
+              <a:buClrTx/>
+              <a:buSzTx/>
+              <a:buFontTx/>
+              <a:buNone/>
+              <a:tabLst/>
+              <a:defRPr/>
+            </a:pPr>
+            <a:endParaRPr lang="en-US" sz="1200" dirty="0">
+              <a:solidFill>
+                <a:schemeClr val="tx1">
+                  <a:lumMod val="65000"/>
+                  <a:lumOff val="35000"/>
+                </a:schemeClr>
+              </a:solidFill>
+              <a:latin typeface="+mj-lt"/>
+              <a:ea typeface="Verdana" panose="020B0604030504040204" pitchFamily="34" charset="0"/>
+            </a:endParaRPr>
+          </a:p>
+          <a:p>
+            <a:pPr marL="0" marR="0" lvl="0" indent="0" algn="l" defTabSz="914400" rtl="0" eaLnBrk="1" fontAlgn="auto" latinLnBrk="0" hangingPunct="1">
+              <a:lnSpc>
+                <a:spcPct val="100000"/>
+              </a:lnSpc>
+              <a:spcBef>
+                <a:spcPts val="0"/>
+              </a:spcBef>
+              <a:spcAft>
+                <a:spcPts val="0"/>
+              </a:spcAft>
+              <a:buClrTx/>
+              <a:buSzTx/>
+              <a:buFontTx/>
+              <a:buNone/>
+              <a:tabLst/>
+              <a:defRPr/>
+            </a:pPr>
+            <a:endParaRPr lang="en-US" sz="1200" dirty="0">
+              <a:solidFill>
+                <a:schemeClr val="tx1">
+                  <a:lumMod val="65000"/>
+                  <a:lumOff val="35000"/>
+                </a:schemeClr>
+              </a:solidFill>
+              <a:latin typeface="Palatino Linotype" panose="02040502050505030304" pitchFamily="18" charset="0"/>
+            </a:endParaRPr>
+          </a:p>
+          <a:p>
+            <a:pPr marL="0" marR="0" lvl="0" indent="0" algn="l" defTabSz="914400" rtl="0" eaLnBrk="1" fontAlgn="auto" latinLnBrk="0" hangingPunct="1">
+              <a:lnSpc>
+                <a:spcPct val="100000"/>
+              </a:lnSpc>
+              <a:spcBef>
+                <a:spcPts val="0"/>
+              </a:spcBef>
+              <a:spcAft>
+                <a:spcPts val="0"/>
+              </a:spcAft>
+              <a:buClrTx/>
+              <a:buSzTx/>
+              <a:buFontTx/>
+              <a:buNone/>
+              <a:tabLst/>
+              <a:defRPr/>
+            </a:pPr>
+            <a:endParaRPr lang="en-US" sz="1200" dirty="0">
+              <a:solidFill>
+                <a:schemeClr val="tx1">
+                  <a:lumMod val="65000"/>
+                  <a:lumOff val="35000"/>
+                </a:schemeClr>
+              </a:solidFill>
+              <a:latin typeface="Palatino Linotype" panose="02040502050505030304" pitchFamily="18" charset="0"/>
+            </a:endParaRPr>
           </a:p>
         </p:txBody>
       </p:sp>
@@ -2911,7 +2946,7 @@
     </p:spTree>
     <p:extLst>
       <p:ext uri="{BB962C8B-B14F-4D97-AF65-F5344CB8AC3E}">
-        <p14:creationId xmlns:p14="http://schemas.microsoft.com/office/powerpoint/2010/main" val="1984289498"/>
+        <p14:creationId xmlns:p14="http://schemas.microsoft.com/office/powerpoint/2010/main" val="1404376956"/>
       </p:ext>
     </p:extLst>
   </p:cSld>
@@ -2996,6 +3031,98 @@
     <p:extLst>
       <p:ext uri="{BB962C8B-B14F-4D97-AF65-F5344CB8AC3E}">
         <p14:creationId xmlns:p14="http://schemas.microsoft.com/office/powerpoint/2010/main" val="2906959665"/>
+      </p:ext>
+    </p:extLst>
+  </p:cSld>
+  <p:clrMapOvr>
+    <a:masterClrMapping/>
+  </p:clrMapOvr>
+</p:notes>
+</file>
+
+<file path=ppt/notesSlides/notesSlide20.xml><?xml version="1.0" encoding="utf-8"?>
+<p:notes xmlns:a="http://schemas.openxmlformats.org/drawingml/2006/main" xmlns:r="http://schemas.openxmlformats.org/officeDocument/2006/relationships" xmlns:p="http://schemas.openxmlformats.org/presentationml/2006/main">
+  <p:cSld>
+    <p:spTree>
+      <p:nvGrpSpPr>
+        <p:cNvPr id="1" name=""/>
+        <p:cNvGrpSpPr/>
+        <p:nvPr/>
+      </p:nvGrpSpPr>
+      <p:grpSpPr>
+        <a:xfrm>
+          <a:off x="0" y="0"/>
+          <a:ext cx="0" cy="0"/>
+          <a:chOff x="0" y="0"/>
+          <a:chExt cx="0" cy="0"/>
+        </a:xfrm>
+      </p:grpSpPr>
+      <p:sp>
+        <p:nvSpPr>
+          <p:cNvPr id="2" name="Slide Image Placeholder 1"/>
+          <p:cNvSpPr>
+            <a:spLocks noGrp="1" noRot="1" noChangeAspect="1"/>
+          </p:cNvSpPr>
+          <p:nvPr>
+            <p:ph type="sldImg"/>
+          </p:nvPr>
+        </p:nvSpPr>
+        <p:spPr/>
+      </p:sp>
+      <p:sp>
+        <p:nvSpPr>
+          <p:cNvPr id="3" name="Notes Placeholder 2"/>
+          <p:cNvSpPr>
+            <a:spLocks noGrp="1"/>
+          </p:cNvSpPr>
+          <p:nvPr>
+            <p:ph type="body" idx="1"/>
+          </p:nvPr>
+        </p:nvSpPr>
+        <p:spPr/>
+        <p:txBody>
+          <a:bodyPr/>
+          <a:lstStyle/>
+          <a:p>
+            <a:r>
+              <a:rPr lang="en-US" dirty="0"/>
+              <a:t>https://playground.tensorflow</a:t>
+            </a:r>
+            <a:r>
+              <a:rPr lang="en-US"/>
+              <a:t>.org/#activation=tanh&amp;batchSize=10&amp;dataset=circle&amp;regDataset=reg-plane&amp;learningRate=0.03&amp;regularizationRate=0&amp;noise=0&amp;networkShape=4,2&amp;seed=0.25293&amp;showTestData=false&amp;discretize=false&amp;percTrainData=50&amp;x=true&amp;y=true&amp;xTimesY=false&amp;xSquared=false&amp;ySquared=false&amp;cosX=false&amp;sinX=false&amp;cosY=false&amp;sinY=false&amp;collectStats=false&amp;problem=classification&amp;initZero=false&amp;hideText=false</a:t>
+            </a:r>
+            <a:endParaRPr lang="en-US" dirty="0"/>
+          </a:p>
+        </p:txBody>
+      </p:sp>
+      <p:sp>
+        <p:nvSpPr>
+          <p:cNvPr id="4" name="Slide Number Placeholder 3"/>
+          <p:cNvSpPr>
+            <a:spLocks noGrp="1"/>
+          </p:cNvSpPr>
+          <p:nvPr>
+            <p:ph type="sldNum" sz="quarter" idx="5"/>
+          </p:nvPr>
+        </p:nvSpPr>
+        <p:spPr/>
+        <p:txBody>
+          <a:bodyPr/>
+          <a:lstStyle/>
+          <a:p>
+            <a:fld id="{3148858F-F1DB-4027-9C85-CCA6849540DD}" type="slidenum">
+              <a:rPr lang="en-US" smtClean="0"/>
+              <a:t>20</a:t>
+            </a:fld>
+            <a:endParaRPr lang="en-US"/>
+          </a:p>
+        </p:txBody>
+      </p:sp>
+    </p:spTree>
+    <p:extLst>
+      <p:ext uri="{BB962C8B-B14F-4D97-AF65-F5344CB8AC3E}">
+        <p14:creationId xmlns:p14="http://schemas.microsoft.com/office/powerpoint/2010/main" val="3369076480"/>
       </p:ext>
     </p:extLst>
   </p:cSld>
@@ -3482,7 +3609,7 @@
                 </a:solidFill>
                 <a:latin typeface="+mn-lt"/>
               </a:rPr>
-              <a:t>What Hubel and Wiesel discovered is that many neurons in the visual cortex have a small </a:t>
+              <a:t>Let’s take talk briefly about Hubel and Wiesel’s research findings.  One of their key discoveries was that many neurons in the visual cortex have a small </a:t>
             </a:r>
             <a:r>
               <a:rPr lang="en-US" sz="1200" b="1" dirty="0">
@@ -3491,7 +3618,16 @@
                 </a:solidFill>
                 <a:latin typeface="+mn-lt"/>
               </a:rPr>
-              <a:t>local receptive field</a:t>
+              <a:t>local receptive field.  </a:t>
+            </a:r>
+            <a:r>
+              <a:rPr lang="en-US" sz="1200" b="0" dirty="0">
+                <a:solidFill>
+                  <a:srgbClr val="000000"/>
+                </a:solidFill>
+                <a:latin typeface="+mn-lt"/>
+              </a:rPr>
+              <a:t>In other words, some neurons only react to visual stimuli located in a limited region of the visual field.   We see that here where the local receptive fields of five neurons are shown as dashed circles. Also, t</a:t>
             </a:r>
             <a:r>
               <a:rPr lang="en-US" sz="1200" dirty="0">
@@ -3500,25 +3636,7 @@
                 </a:solidFill>
                 <a:latin typeface="+mn-lt"/>
               </a:rPr>
-              <a:t>, meaning they only react to visual stimuli located in a limited region of the visual field (see </a:t>
-            </a:r>
-            <a:r>
-              <a:rPr lang="en-US" sz="1200" dirty="0">
-                <a:solidFill>
-                  <a:srgbClr val="9A0000"/>
-                </a:solidFill>
-                <a:latin typeface="+mn-lt"/>
-              </a:rPr>
-              <a:t>figure here</a:t>
-            </a:r>
-            <a:r>
-              <a:rPr lang="en-US" sz="1200" dirty="0">
-                <a:solidFill>
-                  <a:srgbClr val="000000"/>
-                </a:solidFill>
-                <a:latin typeface="+mn-lt"/>
-              </a:rPr>
-              <a:t>, in which the local receptive fields of five neurons are represented by dashed circles). The receptive fields of different neurons may overlap, and together they tile the whole visual field.  </a:t>
+              <a:t>he receptive fields of different neurons may overlap.  And taken together, they tile the entire visual field.</a:t>
             </a:r>
           </a:p>
           <a:p>
@@ -3539,25 +3657,7 @@
                 </a:solidFill>
                 <a:latin typeface="+mn-lt"/>
               </a:rPr>
-              <a:t>The authors also showed that some neurons only react to images of horizontal lines, while others only react to lines with different orientations (two neurons may have the same receptive field but react to different line orientations). They also noticed that some neurons have larger receptive fields, and they react to more complex patterns that are combinations of the lower-level patterns. These observations led to the idea that the higher-level neurons are based on the outputs of neighboring lower-level neurons (in </a:t>
-            </a:r>
-            <a:r>
-              <a:rPr lang="en-US" sz="1200" dirty="0">
-                <a:solidFill>
-                  <a:srgbClr val="9A0000"/>
-                </a:solidFill>
-                <a:latin typeface="+mn-lt"/>
-              </a:rPr>
-              <a:t>this figure</a:t>
-            </a:r>
-            <a:r>
-              <a:rPr lang="en-US" sz="1200" dirty="0">
-                <a:solidFill>
-                  <a:srgbClr val="000000"/>
-                </a:solidFill>
-                <a:latin typeface="+mn-lt"/>
-              </a:rPr>
-              <a:t>, notice that each neuron is connected only to a few neurons from the previous layer). This powerful architecture can detect all sorts of complex patterns in any area of the visual field.</a:t>
+              <a:t>A second important discovery was that some neurons only react to images of horizontal lines, while others react to lines with different orientations.  Interestingly, two neurons may share the same receptive field, but each reacts to different line orientations.  Hubel and Wiesel also learned that some neurons have larger receptive fields, reacting to more complex patterns or combinations of lower-level patterns. </a:t>
             </a:r>
           </a:p>
           <a:p>
@@ -3578,79 +3678,7 @@
                 </a:solidFill>
                 <a:latin typeface="+mn-lt"/>
               </a:rPr>
-              <a:t>These studies of the visual cortex inspired the </a:t>
-            </a:r>
-            <a:r>
-              <a:rPr lang="en-US" sz="1200" b="1" dirty="0">
-                <a:solidFill>
-                  <a:srgbClr val="9A0000"/>
-                </a:solidFill>
-                <a:latin typeface="+mn-lt"/>
-              </a:rPr>
-              <a:t>neocognitron</a:t>
-            </a:r>
-            <a:r>
-              <a:rPr lang="en-US" sz="1200" dirty="0">
-                <a:solidFill>
-                  <a:srgbClr val="000000"/>
-                </a:solidFill>
-                <a:latin typeface="+mn-lt"/>
-              </a:rPr>
-              <a:t>, introduced in 1980, which gradually evolved into what we now call </a:t>
-            </a:r>
-            <a:r>
-              <a:rPr lang="en-US" sz="1200" b="1" dirty="0">
-                <a:solidFill>
-                  <a:srgbClr val="000000"/>
-                </a:solidFill>
-                <a:latin typeface="+mn-lt"/>
-              </a:rPr>
-              <a:t>convolutional neural networks</a:t>
-            </a:r>
-            <a:r>
-              <a:rPr lang="en-US" sz="1200" dirty="0">
-                <a:solidFill>
-                  <a:srgbClr val="000000"/>
-                </a:solidFill>
-                <a:latin typeface="+mn-lt"/>
-              </a:rPr>
-              <a:t>. An important milestone was a </a:t>
-            </a:r>
-            <a:r>
-              <a:rPr lang="en-US" sz="1200" dirty="0">
-                <a:solidFill>
-                  <a:srgbClr val="9A0000"/>
-                </a:solidFill>
-                <a:latin typeface="+mn-lt"/>
-              </a:rPr>
-              <a:t>1998 paper</a:t>
-            </a:r>
-            <a:r>
-              <a:rPr lang="en-US" sz="1200" dirty="0">
-                <a:solidFill>
-                  <a:srgbClr val="000000"/>
-                </a:solidFill>
-                <a:latin typeface="+mn-lt"/>
-              </a:rPr>
-              <a:t> by Yann LeCun et al. that introduced the famous </a:t>
-            </a:r>
-            <a:r>
-              <a:rPr lang="en-US" sz="1200" i="1" dirty="0">
-                <a:solidFill>
-                  <a:srgbClr val="000000"/>
-                </a:solidFill>
-                <a:latin typeface="+mn-lt"/>
-              </a:rPr>
-              <a:t>LeNet-5 </a:t>
-            </a:r>
-            <a:r>
-              <a:rPr lang="en-US" sz="1200" dirty="0">
-                <a:solidFill>
-                  <a:srgbClr val="000000"/>
-                </a:solidFill>
-                <a:latin typeface="+mn-lt"/>
-              </a:rPr>
-              <a:t>architecture.  At the time, this model was widely used by banks to recognize handwritten check numbers.  In today’s final exercise, you will encounter the MNIST dataset they used to develop the LeNet-5 model.</a:t>
+              <a:t>All this led to the idea that higher level neurons receive input from lower-level neurons.  For example, the neurons in the second layer shown here are only connected to a few neurons in the first layer.  Even so, those connections allow second layer neurons to detect more complex shapes, including triangles, x’s, and so on.  The beauty of this architecture lies in its ability to detect all sorts of complex patterns in any area of the visual field. </a:t>
             </a:r>
           </a:p>
           <a:p>
@@ -3664,6 +3692,70 @@
           </a:p>
           <a:p>
             <a:pPr algn="l"/>
+            <a:r>
+              <a:rPr lang="en-US" sz="1200" dirty="0">
+                <a:solidFill>
+                  <a:srgbClr val="000000"/>
+                </a:solidFill>
+                <a:latin typeface="+mn-lt"/>
+              </a:rPr>
+              <a:t>This visual cortex research inspired the </a:t>
+            </a:r>
+            <a:r>
+              <a:rPr lang="en-US" sz="1200" b="1" dirty="0">
+                <a:solidFill>
+                  <a:srgbClr val="9A0000"/>
+                </a:solidFill>
+                <a:latin typeface="+mn-lt"/>
+              </a:rPr>
+              <a:t>neocognitron</a:t>
+            </a:r>
+            <a:r>
+              <a:rPr lang="en-US" sz="1200" b="1" dirty="0">
+                <a:solidFill>
+                  <a:srgbClr val="000000"/>
+                </a:solidFill>
+                <a:latin typeface="+mn-lt"/>
+              </a:rPr>
+              <a:t>, </a:t>
+            </a:r>
+            <a:r>
+              <a:rPr lang="en-US" sz="1200" dirty="0">
+                <a:solidFill>
+                  <a:srgbClr val="000000"/>
+                </a:solidFill>
+                <a:latin typeface="+mn-lt"/>
+              </a:rPr>
+              <a:t>introduced in 1980.  And convolutional neural networks are the direct descendants of this invention.  </a:t>
+            </a:r>
+          </a:p>
+          <a:p>
+            <a:pPr algn="l"/>
+            <a:endParaRPr lang="en-US" sz="1200" dirty="0">
+              <a:solidFill>
+                <a:srgbClr val="000000"/>
+              </a:solidFill>
+              <a:latin typeface="+mn-lt"/>
+            </a:endParaRPr>
+          </a:p>
+          <a:p>
+            <a:pPr marL="0" marR="0" lvl="0" indent="0" algn="l" defTabSz="914400" rtl="0" eaLnBrk="1" fontAlgn="auto" latinLnBrk="0" hangingPunct="1">
+              <a:lnSpc>
+                <a:spcPct val="100000"/>
+              </a:lnSpc>
+              <a:spcBef>
+                <a:spcPts val="0"/>
+              </a:spcBef>
+              <a:spcAft>
+                <a:spcPts val="0"/>
+              </a:spcAft>
+              <a:buClrTx/>
+              <a:buSzTx/>
+              <a:buFontTx/>
+              <a:buNone/>
+              <a:tabLst/>
+              <a:defRPr/>
+            </a:pPr>
             <a:r>
               <a:rPr lang="en-US" sz="1200" dirty="0">
                 <a:solidFill>
@@ -3781,7 +3873,7 @@
                 <a:effectLst/>
                 <a:latin typeface="+mn-lt"/>
               </a:rPr>
-              <a:t>So how can we mimic the eye’s ability to detect patterns in its visual field?</a:t>
+              <a:t>So how do we mimic the eye’s ability to detect patterns in its visual field?</a:t>
             </a:r>
           </a:p>
           <a:p>
@@ -4794,7 +4886,7 @@
           <a:p>
             <a:fld id="{C3F78080-8D0A-4BE8-A5B4-CB115102D524}" type="datetimeFigureOut">
               <a:rPr lang="en-US" smtClean="0"/>
-              <a:t>9/8/2022</a:t>
+              <a:t>9/9/2022</a:t>
             </a:fld>
             <a:endParaRPr lang="en-US"/>
           </a:p>
@@ -4992,7 +5084,7 @@
           <a:p>
             <a:fld id="{C3F78080-8D0A-4BE8-A5B4-CB115102D524}" type="datetimeFigureOut">
               <a:rPr lang="en-US" smtClean="0"/>
-              <a:t>9/8/2022</a:t>
+              <a:t>9/9/2022</a:t>
             </a:fld>
             <a:endParaRPr lang="en-US"/>
           </a:p>
@@ -5200,7 +5292,7 @@
           <a:p>
             <a:fld id="{C3F78080-8D0A-4BE8-A5B4-CB115102D524}" type="datetimeFigureOut">
               <a:rPr lang="en-US" smtClean="0"/>
-              <a:t>9/8/2022</a:t>
+              <a:t>9/9/2022</a:t>
             </a:fld>
             <a:endParaRPr lang="en-US"/>
           </a:p>
@@ -5398,7 +5490,7 @@
           <a:p>
             <a:fld id="{C3F78080-8D0A-4BE8-A5B4-CB115102D524}" type="datetimeFigureOut">
               <a:rPr lang="en-US" smtClean="0"/>
-              <a:t>9/8/2022</a:t>
+              <a:t>9/9/2022</a:t>
             </a:fld>
             <a:endParaRPr lang="en-US"/>
           </a:p>
@@ -5673,7 +5765,7 @@
           <a:p>
             <a:fld id="{C3F78080-8D0A-4BE8-A5B4-CB115102D524}" type="datetimeFigureOut">
               <a:rPr lang="en-US" smtClean="0"/>
-              <a:t>9/8/2022</a:t>
+              <a:t>9/9/2022</a:t>
             </a:fld>
             <a:endParaRPr lang="en-US"/>
           </a:p>
@@ -5938,7 +6030,7 @@
           <a:p>
             <a:fld id="{C3F78080-8D0A-4BE8-A5B4-CB115102D524}" type="datetimeFigureOut">
               <a:rPr lang="en-US" smtClean="0"/>
-              <a:t>9/8/2022</a:t>
+              <a:t>9/9/2022</a:t>
             </a:fld>
             <a:endParaRPr lang="en-US"/>
           </a:p>
@@ -6350,7 +6442,7 @@
           <a:p>
             <a:fld id="{C3F78080-8D0A-4BE8-A5B4-CB115102D524}" type="datetimeFigureOut">
               <a:rPr lang="en-US" smtClean="0"/>
-              <a:t>9/8/2022</a:t>
+              <a:t>9/9/2022</a:t>
             </a:fld>
             <a:endParaRPr lang="en-US"/>
           </a:p>
@@ -6491,7 +6583,7 @@
           <a:p>
             <a:fld id="{C3F78080-8D0A-4BE8-A5B4-CB115102D524}" type="datetimeFigureOut">
               <a:rPr lang="en-US" smtClean="0"/>
-              <a:t>9/8/2022</a:t>
+              <a:t>9/9/2022</a:t>
             </a:fld>
             <a:endParaRPr lang="en-US"/>
           </a:p>
@@ -6604,7 +6696,7 @@
           <a:p>
             <a:fld id="{C3F78080-8D0A-4BE8-A5B4-CB115102D524}" type="datetimeFigureOut">
               <a:rPr lang="en-US" smtClean="0"/>
-              <a:t>9/8/2022</a:t>
+              <a:t>9/9/2022</a:t>
             </a:fld>
             <a:endParaRPr lang="en-US"/>
           </a:p>
@@ -6915,7 +7007,7 @@
           <a:p>
             <a:fld id="{C3F78080-8D0A-4BE8-A5B4-CB115102D524}" type="datetimeFigureOut">
               <a:rPr lang="en-US" smtClean="0"/>
-              <a:t>9/8/2022</a:t>
+              <a:t>9/9/2022</a:t>
             </a:fld>
             <a:endParaRPr lang="en-US"/>
           </a:p>
@@ -7203,7 +7295,7 @@
           <a:p>
             <a:fld id="{C3F78080-8D0A-4BE8-A5B4-CB115102D524}" type="datetimeFigureOut">
               <a:rPr lang="en-US" smtClean="0"/>
-              <a:t>9/8/2022</a:t>
+              <a:t>9/9/2022</a:t>
             </a:fld>
             <a:endParaRPr lang="en-US"/>
           </a:p>
@@ -7444,7 +7536,7 @@
           <a:p>
             <a:fld id="{C3F78080-8D0A-4BE8-A5B4-CB115102D524}" type="datetimeFigureOut">
               <a:rPr lang="en-US" smtClean="0"/>
-              <a:t>9/8/2022</a:t>
+              <a:t>9/9/2022</a:t>
             </a:fld>
             <a:endParaRPr lang="en-US"/>
           </a:p>
@@ -8285,8 +8377,8 @@
         </p:nvSpPr>
         <p:spPr>
           <a:xfrm>
-            <a:off x="0" y="0"/>
-            <a:ext cx="12192000" cy="1325563"/>
+            <a:off x="0" y="534390"/>
+            <a:ext cx="12192000" cy="791173"/>
           </a:xfrm>
         </p:spPr>
         <p:txBody>
@@ -9267,12 +9359,71 @@
           <a:chExt cx="0" cy="0"/>
         </a:xfrm>
       </p:grpSpPr>
+      <p:sp>
+        <p:nvSpPr>
+          <p:cNvPr id="3" name="Text Placeholder 2">
+            <a:extLst>
+              <a:ext uri="{FF2B5EF4-FFF2-40B4-BE49-F238E27FC236}">
+                <a16:creationId xmlns:a16="http://schemas.microsoft.com/office/drawing/2014/main" id="{098BC2D2-CCF7-4C63-8489-B46BF394FCA2}"/>
+              </a:ext>
+            </a:extLst>
+          </p:cNvPr>
+          <p:cNvSpPr>
+            <a:spLocks noGrp="1"/>
+          </p:cNvSpPr>
+          <p:nvPr>
+            <p:ph type="body" idx="1"/>
+          </p:nvPr>
+        </p:nvSpPr>
+        <p:spPr>
+          <a:xfrm>
+            <a:off x="0" y="4285400"/>
+            <a:ext cx="12192000" cy="518830"/>
+          </a:xfrm>
+        </p:spPr>
+        <p:txBody>
+          <a:bodyPr>
+            <a:normAutofit/>
+          </a:bodyPr>
+          <a:lstStyle/>
+          <a:p>
+            <a:endParaRPr lang="en-US" dirty="0">
+              <a:latin typeface="Palatino Linotype" panose="02040502050505030304" pitchFamily="18" charset="0"/>
+              <a:cs typeface="Segoe UI" panose="020B0502040204020203" pitchFamily="34" charset="0"/>
+            </a:endParaRPr>
+          </a:p>
+          <a:p>
+            <a:endParaRPr lang="en-US" dirty="0">
+              <a:latin typeface="Palatino Linotype" panose="02040502050505030304" pitchFamily="18" charset="0"/>
+              <a:cs typeface="Segoe UI" panose="020B0502040204020203" pitchFamily="34" charset="0"/>
+            </a:endParaRPr>
+          </a:p>
+          <a:p>
+            <a:endParaRPr lang="en-US" dirty="0">
+              <a:latin typeface="Palatino Linotype" panose="02040502050505030304" pitchFamily="18" charset="0"/>
+              <a:cs typeface="Segoe UI" panose="020B0502040204020203" pitchFamily="34" charset="0"/>
+            </a:endParaRPr>
+          </a:p>
+          <a:p>
+            <a:endParaRPr lang="en-US" dirty="0">
+              <a:latin typeface="Palatino Linotype" panose="02040502050505030304" pitchFamily="18" charset="0"/>
+              <a:cs typeface="Segoe UI" panose="020B0502040204020203" pitchFamily="34" charset="0"/>
+            </a:endParaRPr>
+          </a:p>
+          <a:p>
+            <a:endParaRPr lang="en-US" dirty="0">
+              <a:latin typeface="Palatino Linotype" panose="02040502050505030304" pitchFamily="18" charset="0"/>
+              <a:cs typeface="Segoe UI" panose="020B0502040204020203" pitchFamily="34" charset="0"/>
+            </a:endParaRPr>
+          </a:p>
+        </p:txBody>
+      </p:sp>
       <p:pic>
         <p:nvPicPr>
-          <p:cNvPr id="4" name="Picture 3">
+          <p:cNvPr id="6" name="Picture 5">
             <a:extLst>
               <a:ext uri="{FF2B5EF4-FFF2-40B4-BE49-F238E27FC236}">
-                <a16:creationId xmlns:a16="http://schemas.microsoft.com/office/drawing/2014/main" id="{76E66F2E-C91C-4311-B65A-B61BFBC7CF8F}"/>
+                <a16:creationId xmlns:a16="http://schemas.microsoft.com/office/drawing/2014/main" id="{4FD57F50-B889-4603-9436-B0404F566685}"/>
               </a:ext>
             </a:extLst>
           </p:cNvPr>
@@ -9282,13 +9433,7 @@
           <p:nvPr/>
         </p:nvPicPr>
         <p:blipFill>
-          <a:blip r:embed="rId3">
-            <a:extLst>
-              <a:ext uri="{28A0092B-C50C-407E-A947-70E740481C1C}">
-                <a14:useLocalDpi xmlns:a14="http://schemas.microsoft.com/office/drawing/2010/main"/>
-              </a:ext>
-            </a:extLst>
-          </a:blip>
+          <a:blip r:embed="rId3"/>
           <a:stretch>
             <a:fillRect/>
           </a:stretch>
@@ -9303,56 +9448,70 @@
           </a:prstGeom>
         </p:spPr>
       </p:pic>
-      <p:pic>
-        <p:nvPicPr>
-          <p:cNvPr id="3" name="Picture 2">
+      <p:sp>
+        <p:nvSpPr>
+          <p:cNvPr id="5" name="TextBox 4">
             <a:extLst>
               <a:ext uri="{FF2B5EF4-FFF2-40B4-BE49-F238E27FC236}">
-                <a16:creationId xmlns:a16="http://schemas.microsoft.com/office/drawing/2014/main" id="{6818FEE8-D9DB-43B3-A9CB-DD82942AF9ED}"/>
+                <a16:creationId xmlns:a16="http://schemas.microsoft.com/office/drawing/2014/main" id="{3FB0C709-F873-4998-9262-CCFA219A0026}"/>
               </a:ext>
             </a:extLst>
           </p:cNvPr>
-          <p:cNvPicPr>
-            <a:picLocks noChangeAspect="1"/>
-          </p:cNvPicPr>
+          <p:cNvSpPr txBox="1"/>
           <p:nvPr/>
-        </p:nvPicPr>
-        <p:blipFill>
-          <a:blip r:embed="rId4">
-            <a:clrChange>
-              <a:clrFrom>
-                <a:srgbClr val="F8F9FA"/>
-              </a:clrFrom>
-              <a:clrTo>
-                <a:srgbClr val="F8F9FA">
-                  <a:alpha val="0"/>
-                </a:srgbClr>
-              </a:clrTo>
-            </a:clrChange>
-            <a:extLst>
-              <a:ext uri="{28A0092B-C50C-407E-A947-70E740481C1C}">
-                <a14:useLocalDpi xmlns:a14="http://schemas.microsoft.com/office/drawing/2010/main"/>
-              </a:ext>
-            </a:extLst>
-          </a:blip>
-          <a:stretch>
-            <a:fillRect/>
-          </a:stretch>
-        </p:blipFill>
+        </p:nvSpPr>
         <p:spPr>
           <a:xfrm>
-            <a:off x="3767137" y="2524125"/>
-            <a:ext cx="4657725" cy="1809750"/>
+            <a:off x="0" y="3291840"/>
+            <a:ext cx="12192000" cy="1200329"/>
           </a:xfrm>
           <a:prstGeom prst="rect">
             <a:avLst/>
           </a:prstGeom>
+          <a:noFill/>
         </p:spPr>
-      </p:pic>
+        <p:txBody>
+          <a:bodyPr wrap="square" rtlCol="0">
+            <a:spAutoFit/>
+          </a:bodyPr>
+          <a:lstStyle/>
+          <a:p>
+            <a:pPr algn="ctr"/>
+            <a:r>
+              <a:rPr lang="en-US" sz="3600" dirty="0">
+                <a:solidFill>
+                  <a:schemeClr val="tx1">
+                    <a:lumMod val="65000"/>
+                    <a:lumOff val="35000"/>
+                  </a:schemeClr>
+                </a:solidFill>
+                <a:latin typeface="Palatino Linotype" panose="02040502050505030304" pitchFamily="18" charset="0"/>
+              </a:rPr>
+              <a:t>The MNIST classifier</a:t>
+            </a:r>
+          </a:p>
+          <a:p>
+            <a:pPr algn="ctr"/>
+            <a:r>
+              <a:rPr lang="en-US" sz="3600" dirty="0">
+                <a:solidFill>
+                  <a:schemeClr val="tx1">
+                    <a:lumMod val="65000"/>
+                    <a:lumOff val="35000"/>
+                  </a:schemeClr>
+                </a:solidFill>
+                <a:latin typeface="Palatino Linotype" panose="02040502050505030304" pitchFamily="18" charset="0"/>
+              </a:rPr>
+              <a:t>01.2_mnist.ipynb</a:t>
+            </a:r>
+            <a:endParaRPr lang="en-US" sz="3600" dirty="0"/>
+          </a:p>
+        </p:txBody>
+      </p:sp>
     </p:spTree>
     <p:extLst>
       <p:ext uri="{BB962C8B-B14F-4D97-AF65-F5344CB8AC3E}">
-        <p14:creationId xmlns:p14="http://schemas.microsoft.com/office/powerpoint/2010/main" val="4119545744"/>
+        <p14:creationId xmlns:p14="http://schemas.microsoft.com/office/powerpoint/2010/main" val="3202979621"/>
       </p:ext>
     </p:extLst>
   </p:cSld>
@@ -10053,6 +10212,44 @@
           </a:p>
         </p:txBody>
       </p:sp>
+      <p:sp>
+        <p:nvSpPr>
+          <p:cNvPr id="16" name="Title 4">
+            <a:extLst>
+              <a:ext uri="{FF2B5EF4-FFF2-40B4-BE49-F238E27FC236}">
+                <a16:creationId xmlns:a16="http://schemas.microsoft.com/office/drawing/2014/main" id="{CFA17968-1E23-1507-1813-81B95AB308D8}"/>
+              </a:ext>
+            </a:extLst>
+          </p:cNvPr>
+          <p:cNvSpPr>
+            <a:spLocks noGrp="1"/>
+          </p:cNvSpPr>
+          <p:nvPr>
+            <p:ph type="title"/>
+          </p:nvPr>
+        </p:nvSpPr>
+        <p:spPr>
+          <a:xfrm>
+            <a:off x="0" y="534390"/>
+            <a:ext cx="12192000" cy="791173"/>
+          </a:xfrm>
+        </p:spPr>
+        <p:txBody>
+          <a:bodyPr>
+            <a:normAutofit/>
+          </a:bodyPr>
+          <a:lstStyle/>
+          <a:p>
+            <a:pPr algn="ctr"/>
+            <a:r>
+              <a:rPr lang="en-US" sz="4400" dirty="0">
+                <a:latin typeface="Palatino Linotype" panose="02040502050505030304" pitchFamily="18" charset="0"/>
+              </a:rPr>
+              <a:t>Numbers Vocabulary</a:t>
+            </a:r>
+          </a:p>
+        </p:txBody>
+      </p:sp>
     </p:spTree>
     <p:extLst>
       <p:ext uri="{BB962C8B-B14F-4D97-AF65-F5344CB8AC3E}">
@@ -10104,6 +10301,51 @@
                                     <p:set>
                                       <p:cBhvr>
                                         <p:cTn id="6" dur="1" fill="hold">
+                                          <p:stCondLst>
+                                            <p:cond delay="0"/>
+                                          </p:stCondLst>
+                                        </p:cTn>
+                                        <p:tgtEl>
+                                          <p:spTgt spid="25"/>
+                                        </p:tgtEl>
+                                        <p:attrNameLst>
+                                          <p:attrName>style.visibility</p:attrName>
+                                        </p:attrNameLst>
+                                      </p:cBhvr>
+                                      <p:to>
+                                        <p:strVal val="visible"/>
+                                      </p:to>
+                                    </p:set>
+                                  </p:childTnLst>
+                                </p:cTn>
+                              </p:par>
+                            </p:childTnLst>
+                          </p:cTn>
+                        </p:par>
+                      </p:childTnLst>
+                    </p:cTn>
+                  </p:par>
+                  <p:par>
+                    <p:cTn id="7" fill="hold">
+                      <p:stCondLst>
+                        <p:cond delay="indefinite"/>
+                      </p:stCondLst>
+                      <p:childTnLst>
+                        <p:par>
+                          <p:cTn id="8" fill="hold">
+                            <p:stCondLst>
+                              <p:cond delay="0"/>
+                            </p:stCondLst>
+                            <p:childTnLst>
+                              <p:par>
+                                <p:cTn id="9" presetID="1" presetClass="entr" presetSubtype="0" fill="hold" nodeType="clickEffect">
+                                  <p:stCondLst>
+                                    <p:cond delay="0"/>
+                                  </p:stCondLst>
+                                  <p:childTnLst>
+                                    <p:set>
+                                      <p:cBhvr>
+                                        <p:cTn id="10" dur="1" fill="hold">
                                           <p:stCondLst>
                                             <p:cond delay="0"/>
                                           </p:stCondLst>
@@ -11877,71 +12119,12 @@
           <a:chExt cx="0" cy="0"/>
         </a:xfrm>
       </p:grpSpPr>
-      <p:sp>
-        <p:nvSpPr>
-          <p:cNvPr id="3" name="Text Placeholder 2">
+      <p:pic>
+        <p:nvPicPr>
+          <p:cNvPr id="4" name="Picture 3">
             <a:extLst>
               <a:ext uri="{FF2B5EF4-FFF2-40B4-BE49-F238E27FC236}">
-                <a16:creationId xmlns:a16="http://schemas.microsoft.com/office/drawing/2014/main" id="{098BC2D2-CCF7-4C63-8489-B46BF394FCA2}"/>
-              </a:ext>
-            </a:extLst>
-          </p:cNvPr>
-          <p:cNvSpPr>
-            <a:spLocks noGrp="1"/>
-          </p:cNvSpPr>
-          <p:nvPr>
-            <p:ph type="body" idx="1"/>
-          </p:nvPr>
-        </p:nvSpPr>
-        <p:spPr>
-          <a:xfrm>
-            <a:off x="0" y="4285400"/>
-            <a:ext cx="12192000" cy="518830"/>
-          </a:xfrm>
-        </p:spPr>
-        <p:txBody>
-          <a:bodyPr>
-            <a:normAutofit/>
-          </a:bodyPr>
-          <a:lstStyle/>
-          <a:p>
-            <a:endParaRPr lang="en-US" dirty="0">
-              <a:latin typeface="Palatino Linotype" panose="02040502050505030304" pitchFamily="18" charset="0"/>
-              <a:cs typeface="Segoe UI" panose="020B0502040204020203" pitchFamily="34" charset="0"/>
-            </a:endParaRPr>
-          </a:p>
-          <a:p>
-            <a:endParaRPr lang="en-US" dirty="0">
-              <a:latin typeface="Palatino Linotype" panose="02040502050505030304" pitchFamily="18" charset="0"/>
-              <a:cs typeface="Segoe UI" panose="020B0502040204020203" pitchFamily="34" charset="0"/>
-            </a:endParaRPr>
-          </a:p>
-          <a:p>
-            <a:endParaRPr lang="en-US" dirty="0">
-              <a:latin typeface="Palatino Linotype" panose="02040502050505030304" pitchFamily="18" charset="0"/>
-              <a:cs typeface="Segoe UI" panose="020B0502040204020203" pitchFamily="34" charset="0"/>
-            </a:endParaRPr>
-          </a:p>
-          <a:p>
-            <a:endParaRPr lang="en-US" dirty="0">
-              <a:latin typeface="Palatino Linotype" panose="02040502050505030304" pitchFamily="18" charset="0"/>
-              <a:cs typeface="Segoe UI" panose="020B0502040204020203" pitchFamily="34" charset="0"/>
-            </a:endParaRPr>
-          </a:p>
-          <a:p>
-            <a:endParaRPr lang="en-US" dirty="0">
-              <a:latin typeface="Palatino Linotype" panose="02040502050505030304" pitchFamily="18" charset="0"/>
-              <a:cs typeface="Segoe UI" panose="020B0502040204020203" pitchFamily="34" charset="0"/>
-            </a:endParaRPr>
-          </a:p>
-        </p:txBody>
-      </p:sp>
-      <p:pic>
-        <p:nvPicPr>
-          <p:cNvPr id="6" name="Picture 5">
-            <a:extLst>
-              <a:ext uri="{FF2B5EF4-FFF2-40B4-BE49-F238E27FC236}">
-                <a16:creationId xmlns:a16="http://schemas.microsoft.com/office/drawing/2014/main" id="{4FD57F50-B889-4603-9436-B0404F566685}"/>
+                <a16:creationId xmlns:a16="http://schemas.microsoft.com/office/drawing/2014/main" id="{76E66F2E-C91C-4311-B65A-B61BFBC7CF8F}"/>
               </a:ext>
             </a:extLst>
           </p:cNvPr>
@@ -11951,7 +12134,13 @@
           <p:nvPr/>
         </p:nvPicPr>
         <p:blipFill>
-          <a:blip r:embed="rId3"/>
+          <a:blip r:embed="rId3">
+            <a:extLst>
+              <a:ext uri="{28A0092B-C50C-407E-A947-70E740481C1C}">
+                <a14:useLocalDpi xmlns:a14="http://schemas.microsoft.com/office/drawing/2010/main"/>
+              </a:ext>
+            </a:extLst>
+          </a:blip>
           <a:stretch>
             <a:fillRect/>
           </a:stretch>
@@ -11966,70 +12155,56 @@
           </a:prstGeom>
         </p:spPr>
       </p:pic>
-      <p:sp>
-        <p:nvSpPr>
-          <p:cNvPr id="5" name="TextBox 4">
+      <p:pic>
+        <p:nvPicPr>
+          <p:cNvPr id="3" name="Picture 2">
             <a:extLst>
               <a:ext uri="{FF2B5EF4-FFF2-40B4-BE49-F238E27FC236}">
-                <a16:creationId xmlns:a16="http://schemas.microsoft.com/office/drawing/2014/main" id="{3FB0C709-F873-4998-9262-CCFA219A0026}"/>
+                <a16:creationId xmlns:a16="http://schemas.microsoft.com/office/drawing/2014/main" id="{6818FEE8-D9DB-43B3-A9CB-DD82942AF9ED}"/>
               </a:ext>
             </a:extLst>
           </p:cNvPr>
-          <p:cNvSpPr txBox="1"/>
+          <p:cNvPicPr>
+            <a:picLocks noChangeAspect="1"/>
+          </p:cNvPicPr>
           <p:nvPr/>
-        </p:nvSpPr>
+        </p:nvPicPr>
+        <p:blipFill>
+          <a:blip r:embed="rId4">
+            <a:clrChange>
+              <a:clrFrom>
+                <a:srgbClr val="F8F9FA"/>
+              </a:clrFrom>
+              <a:clrTo>
+                <a:srgbClr val="F8F9FA">
+                  <a:alpha val="0"/>
+                </a:srgbClr>
+              </a:clrTo>
+            </a:clrChange>
+            <a:extLst>
+              <a:ext uri="{28A0092B-C50C-407E-A947-70E740481C1C}">
+                <a14:useLocalDpi xmlns:a14="http://schemas.microsoft.com/office/drawing/2010/main"/>
+              </a:ext>
+            </a:extLst>
+          </a:blip>
+          <a:stretch>
+            <a:fillRect/>
+          </a:stretch>
+        </p:blipFill>
         <p:spPr>
           <a:xfrm>
-            <a:off x="0" y="3291840"/>
-            <a:ext cx="12192000" cy="1200329"/>
+            <a:off x="3767137" y="2524125"/>
+            <a:ext cx="4657725" cy="1809750"/>
           </a:xfrm>
           <a:prstGeom prst="rect">
             <a:avLst/>
           </a:prstGeom>
-          <a:noFill/>
         </p:spPr>
-        <p:txBody>
-          <a:bodyPr wrap="square" rtlCol="0">
-            <a:spAutoFit/>
-          </a:bodyPr>
-          <a:lstStyle/>
-          <a:p>
-            <a:pPr algn="ctr"/>
-            <a:r>
-              <a:rPr lang="en-US" sz="3600" dirty="0">
-                <a:solidFill>
-                  <a:schemeClr val="tx1">
-                    <a:lumMod val="65000"/>
-                    <a:lumOff val="35000"/>
-                  </a:schemeClr>
-                </a:solidFill>
-                <a:latin typeface="Palatino Linotype" panose="02040502050505030304" pitchFamily="18" charset="0"/>
-              </a:rPr>
-              <a:t>The MNIST classifier</a:t>
-            </a:r>
-          </a:p>
-          <a:p>
-            <a:pPr algn="ctr"/>
-            <a:r>
-              <a:rPr lang="en-US" sz="3600" dirty="0">
-                <a:solidFill>
-                  <a:schemeClr val="tx1">
-                    <a:lumMod val="65000"/>
-                    <a:lumOff val="35000"/>
-                  </a:schemeClr>
-                </a:solidFill>
-                <a:latin typeface="Palatino Linotype" panose="02040502050505030304" pitchFamily="18" charset="0"/>
-              </a:rPr>
-              <a:t>01.2_mnist.ipynb</a:t>
-            </a:r>
-            <a:endParaRPr lang="en-US" sz="3600" dirty="0"/>
-          </a:p>
-        </p:txBody>
-      </p:sp>
+      </p:pic>
     </p:spTree>
     <p:extLst>
       <p:ext uri="{BB962C8B-B14F-4D97-AF65-F5344CB8AC3E}">
-        <p14:creationId xmlns:p14="http://schemas.microsoft.com/office/powerpoint/2010/main" val="3202979621"/>
+        <p14:creationId xmlns:p14="http://schemas.microsoft.com/office/powerpoint/2010/main" val="4119545744"/>
       </p:ext>
     </p:extLst>
   </p:cSld>
@@ -12845,6 +13020,78 @@
           <a:chExt cx="0" cy="0"/>
         </a:xfrm>
       </p:grpSpPr>
+      <p:pic>
+        <p:nvPicPr>
+          <p:cNvPr id="3" name="Picture 2" descr="Shape, arrow&#10;&#10;Description automatically generated">
+            <a:extLst>
+              <a:ext uri="{FF2B5EF4-FFF2-40B4-BE49-F238E27FC236}">
+                <a16:creationId xmlns:a16="http://schemas.microsoft.com/office/drawing/2014/main" id="{67FAC76E-7574-AC54-6F03-7256F2199568}"/>
+              </a:ext>
+            </a:extLst>
+          </p:cNvPr>
+          <p:cNvPicPr>
+            <a:picLocks noChangeAspect="1"/>
+          </p:cNvPicPr>
+          <p:nvPr/>
+        </p:nvPicPr>
+        <p:blipFill>
+          <a:blip r:embed="rId3">
+            <a:extLst>
+              <a:ext uri="{28A0092B-C50C-407E-A947-70E740481C1C}">
+                <a14:useLocalDpi xmlns:a14="http://schemas.microsoft.com/office/drawing/2010/main" val="0"/>
+              </a:ext>
+            </a:extLst>
+          </a:blip>
+          <a:stretch>
+            <a:fillRect/>
+          </a:stretch>
+        </p:blipFill>
+        <p:spPr>
+          <a:xfrm>
+            <a:off x="3796710" y="1387281"/>
+            <a:ext cx="4598579" cy="4083438"/>
+          </a:xfrm>
+          <a:prstGeom prst="rect">
+            <a:avLst/>
+          </a:prstGeom>
+        </p:spPr>
+      </p:pic>
+      <p:pic>
+        <p:nvPicPr>
+          <p:cNvPr id="4" name="Picture 3">
+            <a:extLst>
+              <a:ext uri="{FF2B5EF4-FFF2-40B4-BE49-F238E27FC236}">
+                <a16:creationId xmlns:a16="http://schemas.microsoft.com/office/drawing/2014/main" id="{1DF6089C-2B9A-F7E6-7715-A0A073A4B05E}"/>
+              </a:ext>
+            </a:extLst>
+          </p:cNvPr>
+          <p:cNvPicPr>
+            <a:picLocks noChangeAspect="1"/>
+          </p:cNvPicPr>
+          <p:nvPr/>
+        </p:nvPicPr>
+        <p:blipFill>
+          <a:blip r:embed="rId4">
+            <a:extLst>
+              <a:ext uri="{28A0092B-C50C-407E-A947-70E740481C1C}">
+                <a14:useLocalDpi xmlns:a14="http://schemas.microsoft.com/office/drawing/2010/main"/>
+              </a:ext>
+            </a:extLst>
+          </a:blip>
+          <a:stretch>
+            <a:fillRect/>
+          </a:stretch>
+        </p:blipFill>
+        <p:spPr>
+          <a:xfrm>
+            <a:off x="0" y="365760"/>
+            <a:ext cx="3233668" cy="805144"/>
+          </a:xfrm>
+          <a:prstGeom prst="rect">
+            <a:avLst/>
+          </a:prstGeom>
+        </p:spPr>
+      </p:pic>
     </p:spTree>
     <p:extLst>
       <p:ext uri="{BB962C8B-B14F-4D97-AF65-F5344CB8AC3E}">

</xml_diff>